<commit_message>
Update van de presentatie
Update van de presentatie, foutjes opgelost.
</commit_message>
<xml_diff>
--- a/Presentations/Defusable Alarm Clock Presentation i&i 2017 1.0.pptx
+++ b/Presentations/Defusable Alarm Clock Presentation i&i 2017 1.0.pptx
@@ -28,6 +28,7 @@
     <p:sldId id="273" r:id="rId25"/>
     <p:sldId id="274" r:id="rId26"/>
     <p:sldId id="275" r:id="rId27"/>
+    <p:sldId id="276" r:id="rId28"/>
   </p:sldIdLst>
   <p:sldSz cx="13004800" cy="9753600"/>
   <p:notesSz cx="6858000" cy="9144000"/>
@@ -1155,7 +1156,7 @@
         <p:spPr>
           <a:xfrm>
             <a:off x="-6350" y="-4763"/>
-            <a:ext cx="13017501" cy="9763126"/>
+            <a:ext cx="13017500" cy="9763126"/>
           </a:xfrm>
           <a:prstGeom prst="rect">
             <a:avLst/>
@@ -3975,7 +3976,7 @@
         <p:spPr>
           <a:xfrm>
             <a:off x="337985" y="3818716"/>
-            <a:ext cx="2515708" cy="2526047"/>
+            <a:ext cx="2515708" cy="2526048"/>
           </a:xfrm>
           <a:prstGeom prst="rect">
             <a:avLst/>
@@ -4090,8 +4091,8 @@
         </p:blipFill>
         <p:spPr>
           <a:xfrm>
-            <a:off x="3533279" y="2377219"/>
-            <a:ext cx="3140631" cy="2656106"/>
+            <a:off x="3533280" y="2377219"/>
+            <a:ext cx="3140630" cy="2656106"/>
           </a:xfrm>
           <a:prstGeom prst="rect">
             <a:avLst/>
@@ -4129,7 +4130,7 @@
       </p:grpSpPr>
       <p:sp>
         <p:nvSpPr>
-          <p:cNvPr id="225" name="Rechthoek"/>
+          <p:cNvPr id="227" name="Rechthoek"/>
           <p:cNvSpPr/>
           <p:nvPr/>
         </p:nvSpPr>
@@ -4168,7 +4169,7 @@
       </p:sp>
       <p:pic>
         <p:nvPicPr>
-          <p:cNvPr id="226" name="Lijn" descr="Lijn"/>
+          <p:cNvPr id="228" name="Lijn" descr="Lijn"/>
           <p:cNvPicPr>
             <a:picLocks noChangeAspect="0"/>
           </p:cNvPicPr>
@@ -4200,7 +4201,7 @@
       </p:pic>
       <p:sp>
         <p:nvSpPr>
-          <p:cNvPr id="228" name="Buzzer"/>
+          <p:cNvPr id="230" name="Buzzer"/>
           <p:cNvSpPr/>
           <p:nvPr>
             <p:ph type="title"/>
@@ -4242,7 +4243,7 @@
       </p:sp>
       <p:pic>
         <p:nvPicPr>
-          <p:cNvPr id="229" name="pasted-image.pdf" descr="pasted-image.pdf"/>
+          <p:cNvPr id="231" name="pasted-image.pdf" descr="pasted-image.pdf"/>
           <p:cNvPicPr>
             <a:picLocks noChangeAspect="1"/>
           </p:cNvPicPr>
@@ -4272,7 +4273,7 @@
       </p:pic>
       <p:sp>
         <p:nvSpPr>
-          <p:cNvPr id="230" name="Defusable Alarm Clock met Arduino"/>
+          <p:cNvPr id="232" name="Defusable Alarm Clock met Arduino"/>
           <p:cNvSpPr/>
           <p:nvPr/>
         </p:nvSpPr>
@@ -4326,7 +4327,7 @@
       </p:sp>
       <p:sp>
         <p:nvSpPr>
-          <p:cNvPr id="231" name="Zit op PWM pin…"/>
+          <p:cNvPr id="233" name="Zit op PWM pin…"/>
           <p:cNvSpPr/>
           <p:nvPr>
             <p:ph type="body" idx="4294967295"/>
@@ -4372,7 +4373,7 @@
       </p:sp>
       <p:pic>
         <p:nvPicPr>
-          <p:cNvPr id="232" name="pasted-image.tiff" descr="pasted-image.tiff"/>
+          <p:cNvPr id="234" name="pasted-image.pdf" descr="pasted-image.pdf"/>
           <p:cNvPicPr>
             <a:picLocks noChangeAspect="1"/>
           </p:cNvPicPr>
@@ -4387,80 +4388,9 @@
           </a:stretch>
         </p:blipFill>
         <p:spPr>
-          <a:xfrm>
-            <a:off x="6859186" y="2363919"/>
-            <a:ext cx="5080001" cy="5562601"/>
-          </a:xfrm>
-          <a:prstGeom prst="rect">
-            <a:avLst/>
-          </a:prstGeom>
-          <a:ln w="12700">
-            <a:miter lim="400000"/>
-          </a:ln>
-        </p:spPr>
-      </p:pic>
-      <p:sp>
-        <p:nvSpPr>
-          <p:cNvPr id="233" name="bron: arduino.cc"/>
-          <p:cNvSpPr/>
-          <p:nvPr/>
-        </p:nvSpPr>
-        <p:spPr>
-          <a:xfrm>
-            <a:off x="8190183" y="8092479"/>
-            <a:ext cx="2418006" cy="584201"/>
-          </a:xfrm>
-          <a:prstGeom prst="rect">
-            <a:avLst/>
-          </a:prstGeom>
-          <a:ln w="12700">
-            <a:miter lim="400000"/>
-          </a:ln>
-          <a:extLst>
-            <a:ext uri="{C572A759-6A51-4108-AA02-DFA0A04FC94B}">
-              <ma14:wrappingTextBoxFlag xmlns:ma14="http://schemas.microsoft.com/office/mac/drawingml/2011/main" val="1"/>
-            </a:ext>
-          </a:extLst>
-        </p:spPr>
-        <p:txBody>
-          <a:bodyPr wrap="none" lIns="50800" tIns="50800" rIns="50800" bIns="50800" anchor="ctr">
-            <a:spAutoFit/>
-          </a:bodyPr>
-          <a:lstStyle/>
-          <a:p>
-            <a:pPr/>
-            <a:r>
-              <a:t>bron: </a:t>
-            </a:r>
-            <a:r>
-              <a:rPr u="sng">
-                <a:hlinkClick r:id="rId5" invalidUrl="" action="" tgtFrame="" tooltip="" history="1" highlightClick="0" endSnd="0"/>
-              </a:rPr>
-              <a:t>arduino.cc</a:t>
-            </a:r>
-          </a:p>
-        </p:txBody>
-      </p:sp>
-      <p:pic>
-        <p:nvPicPr>
-          <p:cNvPr id="234" name="pasted-image.pdf" descr="pasted-image.pdf"/>
-          <p:cNvPicPr>
-            <a:picLocks noChangeAspect="1"/>
-          </p:cNvPicPr>
-          <p:nvPr/>
-        </p:nvPicPr>
-        <p:blipFill>
-          <a:blip r:embed="rId6">
-            <a:extLst/>
-          </a:blip>
-          <a:stretch>
-            <a:fillRect/>
-          </a:stretch>
-        </p:blipFill>
-        <p:spPr>
-          <a:xfrm>
-            <a:off x="262693" y="7717069"/>
-            <a:ext cx="1555320" cy="1909830"/>
+          <a:xfrm rot="20682127">
+            <a:off x="10736960" y="84794"/>
+            <a:ext cx="1833028" cy="1738256"/>
           </a:xfrm>
           <a:prstGeom prst="rect">
             <a:avLst/>
@@ -4479,7 +4409,7 @@
           <p:nvPr/>
         </p:nvPicPr>
         <p:blipFill>
-          <a:blip r:embed="rId7">
+          <a:blip r:embed="rId5">
             <a:extLst/>
           </a:blip>
           <a:stretch>
@@ -4487,9 +4417,9 @@
           </a:stretch>
         </p:blipFill>
         <p:spPr>
-          <a:xfrm rot="20682127">
-            <a:off x="10736960" y="84794"/>
-            <a:ext cx="1833028" cy="1738256"/>
+          <a:xfrm>
+            <a:off x="262693" y="7717069"/>
+            <a:ext cx="1555320" cy="1909830"/>
           </a:xfrm>
           <a:prstGeom prst="rect">
             <a:avLst/>
@@ -4598,7 +4528,7 @@
       </p:pic>
       <p:sp>
         <p:nvSpPr>
-          <p:cNvPr id="240" name="Werken met i2c"/>
+          <p:cNvPr id="240" name="Buzzer"/>
           <p:cNvSpPr/>
           <p:nvPr>
             <p:ph type="title"/>
@@ -4633,7 +4563,7 @@
           <a:p>
             <a:pPr/>
             <a:r>
-              <a:t>Werken met i2c</a:t>
+              <a:t>Buzzer</a:t>
             </a:r>
           </a:p>
         </p:txBody>
@@ -4722,9 +4652,55 @@
           </a:p>
         </p:txBody>
       </p:sp>
+      <p:sp>
+        <p:nvSpPr>
+          <p:cNvPr id="243" name="Zit op PWM pin…"/>
+          <p:cNvSpPr/>
+          <p:nvPr>
+            <p:ph type="body" idx="4294967295"/>
+          </p:nvPr>
+        </p:nvSpPr>
+        <p:spPr>
+          <a:xfrm>
+            <a:off x="571500" y="2605550"/>
+            <a:ext cx="11861800" cy="6424150"/>
+          </a:xfrm>
+          <a:prstGeom prst="rect">
+            <a:avLst/>
+          </a:prstGeom>
+        </p:spPr>
+        <p:txBody>
+          <a:bodyPr/>
+          <a:lstStyle/>
+          <a:p>
+            <a:pPr>
+              <a:defRPr>
+                <a:solidFill>
+                  <a:srgbClr val="000000"/>
+                </a:solidFill>
+              </a:defRPr>
+            </a:pPr>
+            <a:r>
+              <a:t>Zit op PWM pin</a:t>
+            </a:r>
+          </a:p>
+          <a:p>
+            <a:pPr>
+              <a:defRPr>
+                <a:solidFill>
+                  <a:srgbClr val="000000"/>
+                </a:solidFill>
+              </a:defRPr>
+            </a:pPr>
+            <a:r>
+              <a:t>Wat is PWM?</a:t>
+            </a:r>
+          </a:p>
+        </p:txBody>
+      </p:sp>
       <p:pic>
         <p:nvPicPr>
-          <p:cNvPr id="243" name="pasted-image.pdf" descr="pasted-image.pdf"/>
+          <p:cNvPr id="244" name="pasted-image.tiff" descr="pasted-image.tiff"/>
           <p:cNvPicPr>
             <a:picLocks noChangeAspect="1"/>
           </p:cNvPicPr>
@@ -4740,8 +4716,8 @@
         </p:blipFill>
         <p:spPr>
           <a:xfrm>
-            <a:off x="1938367" y="3797804"/>
-            <a:ext cx="9128066" cy="2694832"/>
+            <a:off x="6859185" y="2363919"/>
+            <a:ext cx="5080001" cy="5562601"/>
           </a:xfrm>
           <a:prstGeom prst="rect">
             <a:avLst/>
@@ -4751,38 +4727,51 @@
           </a:ln>
         </p:spPr>
       </p:pic>
+      <p:sp>
+        <p:nvSpPr>
+          <p:cNvPr id="245" name="bron: arduino.cc"/>
+          <p:cNvSpPr/>
+          <p:nvPr/>
+        </p:nvSpPr>
+        <p:spPr>
+          <a:xfrm>
+            <a:off x="8190183" y="8092479"/>
+            <a:ext cx="2418006" cy="584201"/>
+          </a:xfrm>
+          <a:prstGeom prst="rect">
+            <a:avLst/>
+          </a:prstGeom>
+          <a:ln w="12700">
+            <a:miter lim="400000"/>
+          </a:ln>
+          <a:extLst>
+            <a:ext uri="{C572A759-6A51-4108-AA02-DFA0A04FC94B}">
+              <ma14:wrappingTextBoxFlag xmlns:ma14="http://schemas.microsoft.com/office/mac/drawingml/2011/main" val="1"/>
+            </a:ext>
+          </a:extLst>
+        </p:spPr>
+        <p:txBody>
+          <a:bodyPr wrap="none" lIns="50800" tIns="50800" rIns="50800" bIns="50800" anchor="ctr">
+            <a:spAutoFit/>
+          </a:bodyPr>
+          <a:lstStyle/>
+          <a:p>
+            <a:pPr/>
+            <a:r>
+              <a:t>bron: </a:t>
+            </a:r>
+            <a:r>
+              <a:rPr u="sng">
+                <a:hlinkClick r:id="rId5" invalidUrl="" action="" tgtFrame="" tooltip="" history="1" highlightClick="0" endSnd="0"/>
+              </a:rPr>
+              <a:t>arduino.cc</a:t>
+            </a:r>
+          </a:p>
+        </p:txBody>
+      </p:sp>
       <p:pic>
         <p:nvPicPr>
-          <p:cNvPr id="244" name="pasted-image.pdf" descr="pasted-image.pdf"/>
-          <p:cNvPicPr>
-            <a:picLocks noChangeAspect="1"/>
-          </p:cNvPicPr>
-          <p:nvPr/>
-        </p:nvPicPr>
-        <p:blipFill>
-          <a:blip r:embed="rId5">
-            <a:extLst/>
-          </a:blip>
-          <a:stretch>
-            <a:fillRect/>
-          </a:stretch>
-        </p:blipFill>
-        <p:spPr>
-          <a:xfrm rot="20682127">
-            <a:off x="10736960" y="122894"/>
-            <a:ext cx="1833028" cy="1738256"/>
-          </a:xfrm>
-          <a:prstGeom prst="rect">
-            <a:avLst/>
-          </a:prstGeom>
-          <a:ln w="12700">
-            <a:miter lim="400000"/>
-          </a:ln>
-        </p:spPr>
-      </p:pic>
-      <p:pic>
-        <p:nvPicPr>
-          <p:cNvPr id="245" name="pasted-image.pdf" descr="pasted-image.pdf"/>
+          <p:cNvPr id="246" name="pasted-image.pdf" descr="pasted-image.pdf"/>
           <p:cNvPicPr>
             <a:picLocks noChangeAspect="1"/>
           </p:cNvPicPr>
@@ -4800,6 +4789,35 @@
           <a:xfrm>
             <a:off x="262693" y="7717069"/>
             <a:ext cx="1555320" cy="1909830"/>
+          </a:xfrm>
+          <a:prstGeom prst="rect">
+            <a:avLst/>
+          </a:prstGeom>
+          <a:ln w="12700">
+            <a:miter lim="400000"/>
+          </a:ln>
+        </p:spPr>
+      </p:pic>
+      <p:pic>
+        <p:nvPicPr>
+          <p:cNvPr id="247" name="pasted-image.pdf" descr="pasted-image.pdf"/>
+          <p:cNvPicPr>
+            <a:picLocks noChangeAspect="1"/>
+          </p:cNvPicPr>
+          <p:nvPr/>
+        </p:nvPicPr>
+        <p:blipFill>
+          <a:blip r:embed="rId7">
+            <a:extLst/>
+          </a:blip>
+          <a:stretch>
+            <a:fillRect/>
+          </a:stretch>
+        </p:blipFill>
+        <p:spPr>
+          <a:xfrm rot="20682127">
+            <a:off x="10736960" y="84794"/>
+            <a:ext cx="1833028" cy="1738256"/>
           </a:xfrm>
           <a:prstGeom prst="rect">
             <a:avLst/>
@@ -4837,7 +4855,7 @@
       </p:grpSpPr>
       <p:sp>
         <p:nvSpPr>
-          <p:cNvPr id="247" name="Rechthoek"/>
+          <p:cNvPr id="249" name="Rechthoek"/>
           <p:cNvSpPr/>
           <p:nvPr/>
         </p:nvSpPr>
@@ -4876,7 +4894,7 @@
       </p:sp>
       <p:pic>
         <p:nvPicPr>
-          <p:cNvPr id="248" name="Lijn" descr="Lijn"/>
+          <p:cNvPr id="250" name="Lijn" descr="Lijn"/>
           <p:cNvPicPr>
             <a:picLocks noChangeAspect="0"/>
           </p:cNvPicPr>
@@ -4908,7 +4926,7 @@
       </p:pic>
       <p:sp>
         <p:nvSpPr>
-          <p:cNvPr id="250" name="Werken met i2c"/>
+          <p:cNvPr id="252" name="Werken met i2c"/>
           <p:cNvSpPr/>
           <p:nvPr>
             <p:ph type="title"/>
@@ -4950,7 +4968,7 @@
       </p:sp>
       <p:pic>
         <p:nvPicPr>
-          <p:cNvPr id="251" name="pasted-image.pdf" descr="pasted-image.pdf"/>
+          <p:cNvPr id="253" name="pasted-image.pdf" descr="pasted-image.pdf"/>
           <p:cNvPicPr>
             <a:picLocks noChangeAspect="1"/>
           </p:cNvPicPr>
@@ -4980,7 +4998,7 @@
       </p:pic>
       <p:sp>
         <p:nvSpPr>
-          <p:cNvPr id="252" name="Defusable Alarm Clock met Arduino"/>
+          <p:cNvPr id="254" name="Defusable Alarm Clock met Arduino"/>
           <p:cNvSpPr/>
           <p:nvPr/>
         </p:nvSpPr>
@@ -5032,117 +5050,9 @@
           </a:p>
         </p:txBody>
       </p:sp>
-      <p:sp>
-        <p:nvSpPr>
-          <p:cNvPr id="253" name="I2C_Scanner voorbeeld"/>
-          <p:cNvSpPr/>
-          <p:nvPr/>
-        </p:nvSpPr>
-        <p:spPr>
-          <a:xfrm>
-            <a:off x="4785660" y="2730500"/>
-            <a:ext cx="3433480" cy="584200"/>
-          </a:xfrm>
-          <a:prstGeom prst="rect">
-            <a:avLst/>
-          </a:prstGeom>
-          <a:ln w="12700">
-            <a:miter lim="400000"/>
-          </a:ln>
-          <a:extLst>
-            <a:ext uri="{C572A759-6A51-4108-AA02-DFA0A04FC94B}">
-              <ma14:wrappingTextBoxFlag xmlns:ma14="http://schemas.microsoft.com/office/mac/drawingml/2011/main" val="1"/>
-            </a:ext>
-          </a:extLst>
-        </p:spPr>
-        <p:txBody>
-          <a:bodyPr wrap="none" lIns="50800" tIns="50800" rIns="50800" bIns="50800" anchor="ctr">
-            <a:spAutoFit/>
-          </a:bodyPr>
-          <a:lstStyle/>
-          <a:p>
-            <a:pPr/>
-            <a:r>
-              <a:t>I2C_Scanner voorbeeld</a:t>
-            </a:r>
-          </a:p>
-        </p:txBody>
-      </p:sp>
-      <p:sp>
-        <p:nvSpPr>
-          <p:cNvPr id="254" name="Debuggen: Scope"/>
-          <p:cNvSpPr/>
-          <p:nvPr/>
-        </p:nvSpPr>
-        <p:spPr>
-          <a:xfrm>
-            <a:off x="5240741" y="4136363"/>
-            <a:ext cx="2523318" cy="584201"/>
-          </a:xfrm>
-          <a:prstGeom prst="rect">
-            <a:avLst/>
-          </a:prstGeom>
-          <a:ln w="12700">
-            <a:miter lim="400000"/>
-          </a:ln>
-          <a:extLst>
-            <a:ext uri="{C572A759-6A51-4108-AA02-DFA0A04FC94B}">
-              <ma14:wrappingTextBoxFlag xmlns:ma14="http://schemas.microsoft.com/office/mac/drawingml/2011/main" val="1"/>
-            </a:ext>
-          </a:extLst>
-        </p:spPr>
-        <p:txBody>
-          <a:bodyPr wrap="none" lIns="50800" tIns="50800" rIns="50800" bIns="50800" anchor="ctr">
-            <a:spAutoFit/>
-          </a:bodyPr>
-          <a:lstStyle/>
-          <a:p>
-            <a:pPr/>
-            <a:r>
-              <a:t>Debuggen: Scope</a:t>
-            </a:r>
-          </a:p>
-        </p:txBody>
-      </p:sp>
-      <p:sp>
-        <p:nvSpPr>
-          <p:cNvPr id="255" name="Pull-up weerstanden van SDA en SCL naar Power"/>
-          <p:cNvSpPr/>
-          <p:nvPr/>
-        </p:nvSpPr>
-        <p:spPr>
-          <a:xfrm>
-            <a:off x="2881297" y="5304068"/>
-            <a:ext cx="7242206" cy="584201"/>
-          </a:xfrm>
-          <a:prstGeom prst="rect">
-            <a:avLst/>
-          </a:prstGeom>
-          <a:ln w="12700">
-            <a:miter lim="400000"/>
-          </a:ln>
-          <a:extLst>
-            <a:ext uri="{C572A759-6A51-4108-AA02-DFA0A04FC94B}">
-              <ma14:wrappingTextBoxFlag xmlns:ma14="http://schemas.microsoft.com/office/mac/drawingml/2011/main" val="1"/>
-            </a:ext>
-          </a:extLst>
-        </p:spPr>
-        <p:txBody>
-          <a:bodyPr wrap="none" lIns="50800" tIns="50800" rIns="50800" bIns="50800" anchor="ctr">
-            <a:spAutoFit/>
-          </a:bodyPr>
-          <a:lstStyle/>
-          <a:p>
-            <a:pPr/>
-            <a:r>
-              <a:t>Pull-up weerstanden van SDA en SCL naar Power</a:t>
-            </a:r>
-          </a:p>
-        </p:txBody>
-      </p:sp>
       <p:pic>
         <p:nvPicPr>
-          <p:cNvPr id="256" name="pasted-image.pdf" descr="pasted-image.pdf"/>
+          <p:cNvPr id="255" name="pasted-image.pdf" descr="pasted-image.pdf"/>
           <p:cNvPicPr>
             <a:picLocks noChangeAspect="1"/>
           </p:cNvPicPr>
@@ -5157,9 +5067,9 @@
           </a:stretch>
         </p:blipFill>
         <p:spPr>
-          <a:xfrm>
-            <a:off x="262693" y="7717069"/>
-            <a:ext cx="1555320" cy="1909830"/>
+          <a:xfrm rot="20682127">
+            <a:off x="10736960" y="122894"/>
+            <a:ext cx="1833028" cy="1738256"/>
           </a:xfrm>
           <a:prstGeom prst="rect">
             <a:avLst/>
@@ -5171,7 +5081,7 @@
       </p:pic>
       <p:pic>
         <p:nvPicPr>
-          <p:cNvPr id="257" name="pasted-image.pdf" descr="pasted-image.pdf"/>
+          <p:cNvPr id="256" name="pasted-image.pdf" descr="pasted-image.pdf"/>
           <p:cNvPicPr>
             <a:picLocks noChangeAspect="1"/>
           </p:cNvPicPr>
@@ -5186,9 +5096,9 @@
           </a:stretch>
         </p:blipFill>
         <p:spPr>
-          <a:xfrm rot="20682127">
-            <a:off x="10736960" y="84794"/>
-            <a:ext cx="1833028" cy="1738256"/>
+          <a:xfrm>
+            <a:off x="262693" y="7717069"/>
+            <a:ext cx="1555320" cy="1909830"/>
           </a:xfrm>
           <a:prstGeom prst="rect">
             <a:avLst/>
@@ -5200,7 +5110,7 @@
       </p:pic>
       <p:pic>
         <p:nvPicPr>
-          <p:cNvPr id="258" name="pasted-image.pdf" descr="pasted-image.pdf"/>
+          <p:cNvPr id="257" name="pasted-image.pdf" descr="pasted-image.pdf"/>
           <p:cNvPicPr>
             <a:picLocks noChangeAspect="1"/>
           </p:cNvPicPr>
@@ -5216,8 +5126,8 @@
         </p:blipFill>
         <p:spPr>
           <a:xfrm>
-            <a:off x="3373869" y="6441834"/>
-            <a:ext cx="6257062" cy="1847240"/>
+            <a:off x="1986745" y="4004127"/>
+            <a:ext cx="9316214" cy="2743222"/>
           </a:xfrm>
           <a:prstGeom prst="rect">
             <a:avLst/>
@@ -5255,7 +5165,7 @@
       </p:grpSpPr>
       <p:sp>
         <p:nvSpPr>
-          <p:cNvPr id="260" name="Rechthoek"/>
+          <p:cNvPr id="259" name="Rechthoek"/>
           <p:cNvSpPr/>
           <p:nvPr/>
         </p:nvSpPr>
@@ -5294,7 +5204,7 @@
       </p:sp>
       <p:pic>
         <p:nvPicPr>
-          <p:cNvPr id="261" name="Lijn" descr="Lijn"/>
+          <p:cNvPr id="260" name="Lijn" descr="Lijn"/>
           <p:cNvPicPr>
             <a:picLocks noChangeAspect="0"/>
           </p:cNvPicPr>
@@ -5326,7 +5236,7 @@
       </p:pic>
       <p:sp>
         <p:nvSpPr>
-          <p:cNvPr id="263" name="Segment Display"/>
+          <p:cNvPr id="262" name="Werken met i2c"/>
           <p:cNvSpPr/>
           <p:nvPr>
             <p:ph type="title"/>
@@ -5361,14 +5271,14 @@
           <a:p>
             <a:pPr/>
             <a:r>
-              <a:t>Segment Display</a:t>
+              <a:t>Werken met i2c</a:t>
             </a:r>
           </a:p>
         </p:txBody>
       </p:sp>
       <p:pic>
         <p:nvPicPr>
-          <p:cNvPr id="264" name="pasted-image.pdf" descr="pasted-image.pdf"/>
+          <p:cNvPr id="263" name="pasted-image.pdf" descr="pasted-image.pdf"/>
           <p:cNvPicPr>
             <a:picLocks noChangeAspect="1"/>
           </p:cNvPicPr>
@@ -5398,7 +5308,7 @@
       </p:pic>
       <p:sp>
         <p:nvSpPr>
-          <p:cNvPr id="265" name="Defusable Alarm Clock met Arduino"/>
+          <p:cNvPr id="264" name="Defusable Alarm Clock met Arduino"/>
           <p:cNvSpPr/>
           <p:nvPr/>
         </p:nvSpPr>
@@ -5450,9 +5360,117 @@
           </a:p>
         </p:txBody>
       </p:sp>
+      <p:sp>
+        <p:nvSpPr>
+          <p:cNvPr id="265" name="I2C_Scanner voorbeeld"/>
+          <p:cNvSpPr/>
+          <p:nvPr/>
+        </p:nvSpPr>
+        <p:spPr>
+          <a:xfrm>
+            <a:off x="4785660" y="2730499"/>
+            <a:ext cx="3433480" cy="584201"/>
+          </a:xfrm>
+          <a:prstGeom prst="rect">
+            <a:avLst/>
+          </a:prstGeom>
+          <a:ln w="12700">
+            <a:miter lim="400000"/>
+          </a:ln>
+          <a:extLst>
+            <a:ext uri="{C572A759-6A51-4108-AA02-DFA0A04FC94B}">
+              <ma14:wrappingTextBoxFlag xmlns:ma14="http://schemas.microsoft.com/office/mac/drawingml/2011/main" val="1"/>
+            </a:ext>
+          </a:extLst>
+        </p:spPr>
+        <p:txBody>
+          <a:bodyPr wrap="none" lIns="50800" tIns="50800" rIns="50800" bIns="50800" anchor="ctr">
+            <a:spAutoFit/>
+          </a:bodyPr>
+          <a:lstStyle/>
+          <a:p>
+            <a:pPr/>
+            <a:r>
+              <a:t>I2C_Scanner voorbeeld</a:t>
+            </a:r>
+          </a:p>
+        </p:txBody>
+      </p:sp>
+      <p:sp>
+        <p:nvSpPr>
+          <p:cNvPr id="266" name="Debuggen: Scope"/>
+          <p:cNvSpPr/>
+          <p:nvPr/>
+        </p:nvSpPr>
+        <p:spPr>
+          <a:xfrm>
+            <a:off x="5240741" y="4136363"/>
+            <a:ext cx="2523318" cy="584201"/>
+          </a:xfrm>
+          <a:prstGeom prst="rect">
+            <a:avLst/>
+          </a:prstGeom>
+          <a:ln w="12700">
+            <a:miter lim="400000"/>
+          </a:ln>
+          <a:extLst>
+            <a:ext uri="{C572A759-6A51-4108-AA02-DFA0A04FC94B}">
+              <ma14:wrappingTextBoxFlag xmlns:ma14="http://schemas.microsoft.com/office/mac/drawingml/2011/main" val="1"/>
+            </a:ext>
+          </a:extLst>
+        </p:spPr>
+        <p:txBody>
+          <a:bodyPr wrap="none" lIns="50800" tIns="50800" rIns="50800" bIns="50800" anchor="ctr">
+            <a:spAutoFit/>
+          </a:bodyPr>
+          <a:lstStyle/>
+          <a:p>
+            <a:pPr/>
+            <a:r>
+              <a:t>Debuggen: Scope</a:t>
+            </a:r>
+          </a:p>
+        </p:txBody>
+      </p:sp>
+      <p:sp>
+        <p:nvSpPr>
+          <p:cNvPr id="267" name="Pull-up weerstanden van SDA en SCL naar Power"/>
+          <p:cNvSpPr/>
+          <p:nvPr/>
+        </p:nvSpPr>
+        <p:spPr>
+          <a:xfrm>
+            <a:off x="2881297" y="5304068"/>
+            <a:ext cx="7242206" cy="584201"/>
+          </a:xfrm>
+          <a:prstGeom prst="rect">
+            <a:avLst/>
+          </a:prstGeom>
+          <a:ln w="12700">
+            <a:miter lim="400000"/>
+          </a:ln>
+          <a:extLst>
+            <a:ext uri="{C572A759-6A51-4108-AA02-DFA0A04FC94B}">
+              <ma14:wrappingTextBoxFlag xmlns:ma14="http://schemas.microsoft.com/office/mac/drawingml/2011/main" val="1"/>
+            </a:ext>
+          </a:extLst>
+        </p:spPr>
+        <p:txBody>
+          <a:bodyPr wrap="none" lIns="50800" tIns="50800" rIns="50800" bIns="50800" anchor="ctr">
+            <a:spAutoFit/>
+          </a:bodyPr>
+          <a:lstStyle/>
+          <a:p>
+            <a:pPr/>
+            <a:r>
+              <a:t>Pull-up weerstanden van SDA en SCL naar Power</a:t>
+            </a:r>
+          </a:p>
+        </p:txBody>
+      </p:sp>
       <p:pic>
         <p:nvPicPr>
-          <p:cNvPr id="266" name="pasted-image.pdf" descr="pasted-image.pdf"/>
+          <p:cNvPr id="268" name="pasted-image.pdf" descr="pasted-image.pdf"/>
           <p:cNvPicPr>
             <a:picLocks noChangeAspect="1"/>
           </p:cNvPicPr>
@@ -5467,9 +5485,9 @@
           </a:stretch>
         </p:blipFill>
         <p:spPr>
-          <a:xfrm rot="20682127">
-            <a:off x="10736960" y="84794"/>
-            <a:ext cx="1833028" cy="1738256"/>
+          <a:xfrm>
+            <a:off x="262693" y="7717069"/>
+            <a:ext cx="1555320" cy="1909830"/>
           </a:xfrm>
           <a:prstGeom prst="rect">
             <a:avLst/>
@@ -5481,7 +5499,7 @@
       </p:pic>
       <p:pic>
         <p:nvPicPr>
-          <p:cNvPr id="267" name="pasted-image.pdf" descr="pasted-image.pdf"/>
+          <p:cNvPr id="269" name="pasted-image.pdf" descr="pasted-image.pdf"/>
           <p:cNvPicPr>
             <a:picLocks noChangeAspect="1"/>
           </p:cNvPicPr>
@@ -5496,9 +5514,9 @@
           </a:stretch>
         </p:blipFill>
         <p:spPr>
-          <a:xfrm>
-            <a:off x="3363401" y="3692137"/>
-            <a:ext cx="6277998" cy="2220366"/>
+          <a:xfrm rot="20682127">
+            <a:off x="10736960" y="84794"/>
+            <a:ext cx="1833028" cy="1738256"/>
           </a:xfrm>
           <a:prstGeom prst="rect">
             <a:avLst/>
@@ -5508,189 +5526,9 @@
           </a:ln>
         </p:spPr>
       </p:pic>
-      <p:sp>
-        <p:nvSpPr>
-          <p:cNvPr id="268" name="Common:"/>
-          <p:cNvSpPr/>
-          <p:nvPr/>
-        </p:nvSpPr>
-        <p:spPr>
-          <a:xfrm>
-            <a:off x="1600549" y="6430433"/>
-            <a:ext cx="1494224" cy="584201"/>
-          </a:xfrm>
-          <a:prstGeom prst="rect">
-            <a:avLst/>
-          </a:prstGeom>
-          <a:ln w="12700">
-            <a:miter lim="400000"/>
-          </a:ln>
-          <a:extLst>
-            <a:ext uri="{C572A759-6A51-4108-AA02-DFA0A04FC94B}">
-              <ma14:wrappingTextBoxFlag xmlns:ma14="http://schemas.microsoft.com/office/mac/drawingml/2011/main" val="1"/>
-            </a:ext>
-          </a:extLst>
-        </p:spPr>
-        <p:txBody>
-          <a:bodyPr wrap="none" lIns="50800" tIns="50800" rIns="50800" bIns="50800" anchor="ctr">
-            <a:spAutoFit/>
-          </a:bodyPr>
-          <a:lstStyle/>
-          <a:p>
-            <a:pPr/>
-            <a:r>
-              <a:t>Common:</a:t>
-            </a:r>
-          </a:p>
-        </p:txBody>
-      </p:sp>
-      <p:sp>
-        <p:nvSpPr>
-          <p:cNvPr id="269" name="Anode, positieve pinnen met elkaar verbonden"/>
-          <p:cNvSpPr/>
-          <p:nvPr/>
-        </p:nvSpPr>
-        <p:spPr>
-          <a:xfrm>
-            <a:off x="3391249" y="6430433"/>
-            <a:ext cx="6628331" cy="584201"/>
-          </a:xfrm>
-          <a:prstGeom prst="rect">
-            <a:avLst/>
-          </a:prstGeom>
-          <a:ln w="12700">
-            <a:miter lim="400000"/>
-          </a:ln>
-          <a:extLst>
-            <a:ext uri="{C572A759-6A51-4108-AA02-DFA0A04FC94B}">
-              <ma14:wrappingTextBoxFlag xmlns:ma14="http://schemas.microsoft.com/office/mac/drawingml/2011/main" val="1"/>
-            </a:ext>
-          </a:extLst>
-        </p:spPr>
-        <p:txBody>
-          <a:bodyPr wrap="none" lIns="50800" tIns="50800" rIns="50800" bIns="50800" anchor="ctr">
-            <a:spAutoFit/>
-          </a:bodyPr>
-          <a:lstStyle/>
-          <a:p>
-            <a:pPr/>
-            <a:r>
-              <a:t>Anode, positieve pinnen met elkaar verbonden</a:t>
-            </a:r>
-          </a:p>
-        </p:txBody>
-      </p:sp>
-      <p:sp>
-        <p:nvSpPr>
-          <p:cNvPr id="270" name="Kathode, positieve pinnen met elkaar verbonden"/>
-          <p:cNvSpPr/>
-          <p:nvPr/>
-        </p:nvSpPr>
-        <p:spPr>
-          <a:xfrm>
-            <a:off x="3391249" y="6925733"/>
-            <a:ext cx="6899885" cy="584201"/>
-          </a:xfrm>
-          <a:prstGeom prst="rect">
-            <a:avLst/>
-          </a:prstGeom>
-          <a:ln w="12700">
-            <a:miter lim="400000"/>
-          </a:ln>
-          <a:extLst>
-            <a:ext uri="{C572A759-6A51-4108-AA02-DFA0A04FC94B}">
-              <ma14:wrappingTextBoxFlag xmlns:ma14="http://schemas.microsoft.com/office/mac/drawingml/2011/main" val="1"/>
-            </a:ext>
-          </a:extLst>
-        </p:spPr>
-        <p:txBody>
-          <a:bodyPr wrap="none" lIns="50800" tIns="50800" rIns="50800" bIns="50800" anchor="ctr">
-            <a:spAutoFit/>
-          </a:bodyPr>
-          <a:lstStyle/>
-          <a:p>
-            <a:pPr/>
-            <a:r>
-              <a:t>Kathode, positieve pinnen met elkaar verbonden</a:t>
-            </a:r>
-          </a:p>
-        </p:txBody>
-      </p:sp>
-      <p:sp>
-        <p:nvSpPr>
-          <p:cNvPr id="271" name="Kathode = Negatief"/>
-          <p:cNvSpPr/>
-          <p:nvPr/>
-        </p:nvSpPr>
-        <p:spPr>
-          <a:xfrm>
-            <a:off x="9779349" y="2247899"/>
-            <a:ext cx="2980222" cy="584201"/>
-          </a:xfrm>
-          <a:prstGeom prst="rect">
-            <a:avLst/>
-          </a:prstGeom>
-          <a:ln w="12700">
-            <a:miter lim="400000"/>
-          </a:ln>
-          <a:extLst>
-            <a:ext uri="{C572A759-6A51-4108-AA02-DFA0A04FC94B}">
-              <ma14:wrappingTextBoxFlag xmlns:ma14="http://schemas.microsoft.com/office/mac/drawingml/2011/main" val="1"/>
-            </a:ext>
-          </a:extLst>
-        </p:spPr>
-        <p:txBody>
-          <a:bodyPr wrap="none" lIns="50800" tIns="50800" rIns="50800" bIns="50800" anchor="ctr">
-            <a:spAutoFit/>
-          </a:bodyPr>
-          <a:lstStyle/>
-          <a:p>
-            <a:pPr/>
-            <a:r>
-              <a:t>Kathode = Negatief</a:t>
-            </a:r>
-          </a:p>
-        </p:txBody>
-      </p:sp>
-      <p:sp>
-        <p:nvSpPr>
-          <p:cNvPr id="272" name="Anode = Positief"/>
-          <p:cNvSpPr/>
-          <p:nvPr/>
-        </p:nvSpPr>
-        <p:spPr>
-          <a:xfrm>
-            <a:off x="9779349" y="2747433"/>
-            <a:ext cx="2557433" cy="584201"/>
-          </a:xfrm>
-          <a:prstGeom prst="rect">
-            <a:avLst/>
-          </a:prstGeom>
-          <a:ln w="12700">
-            <a:miter lim="400000"/>
-          </a:ln>
-          <a:extLst>
-            <a:ext uri="{C572A759-6A51-4108-AA02-DFA0A04FC94B}">
-              <ma14:wrappingTextBoxFlag xmlns:ma14="http://schemas.microsoft.com/office/mac/drawingml/2011/main" val="1"/>
-            </a:ext>
-          </a:extLst>
-        </p:spPr>
-        <p:txBody>
-          <a:bodyPr wrap="none" lIns="50800" tIns="50800" rIns="50800" bIns="50800" anchor="ctr">
-            <a:spAutoFit/>
-          </a:bodyPr>
-          <a:lstStyle/>
-          <a:p>
-            <a:pPr/>
-            <a:r>
-              <a:t>Anode = Positief</a:t>
-            </a:r>
-          </a:p>
-        </p:txBody>
-      </p:sp>
       <p:pic>
         <p:nvPicPr>
-          <p:cNvPr id="273" name="pasted-image.pdf" descr="pasted-image.pdf"/>
+          <p:cNvPr id="270" name="pasted-image.pdf" descr="pasted-image.pdf"/>
           <p:cNvPicPr>
             <a:picLocks noChangeAspect="1"/>
           </p:cNvPicPr>
@@ -5706,8 +5544,8 @@
         </p:blipFill>
         <p:spPr>
           <a:xfrm>
-            <a:off x="262693" y="7717069"/>
-            <a:ext cx="1555320" cy="1909830"/>
+            <a:off x="3142445" y="6169603"/>
+            <a:ext cx="6719910" cy="1978722"/>
           </a:xfrm>
           <a:prstGeom prst="rect">
             <a:avLst/>
@@ -5745,7 +5583,7 @@
       </p:grpSpPr>
       <p:sp>
         <p:nvSpPr>
-          <p:cNvPr id="275" name="Rechthoek"/>
+          <p:cNvPr id="272" name="Rechthoek"/>
           <p:cNvSpPr/>
           <p:nvPr/>
         </p:nvSpPr>
@@ -5784,7 +5622,7 @@
       </p:sp>
       <p:pic>
         <p:nvPicPr>
-          <p:cNvPr id="276" name="Lijn" descr="Lijn"/>
+          <p:cNvPr id="273" name="Lijn" descr="Lijn"/>
           <p:cNvPicPr>
             <a:picLocks noChangeAspect="0"/>
           </p:cNvPicPr>
@@ -5816,7 +5654,7 @@
       </p:pic>
       <p:sp>
         <p:nvSpPr>
-          <p:cNvPr id="278" name="Segment Display"/>
+          <p:cNvPr id="275" name="Segment Display"/>
           <p:cNvSpPr/>
           <p:nvPr>
             <p:ph type="title"/>
@@ -5858,7 +5696,7 @@
       </p:sp>
       <p:pic>
         <p:nvPicPr>
-          <p:cNvPr id="279" name="pasted-image.pdf" descr="pasted-image.pdf"/>
+          <p:cNvPr id="276" name="pasted-image.pdf" descr="pasted-image.pdf"/>
           <p:cNvPicPr>
             <a:picLocks noChangeAspect="1"/>
           </p:cNvPicPr>
@@ -5888,7 +5726,7 @@
       </p:pic>
       <p:sp>
         <p:nvSpPr>
-          <p:cNvPr id="280" name="Defusable Alarm Clock met Arduino"/>
+          <p:cNvPr id="277" name="Defusable Alarm Clock met Arduino"/>
           <p:cNvSpPr/>
           <p:nvPr/>
         </p:nvSpPr>
@@ -5942,7 +5780,7 @@
       </p:sp>
       <p:pic>
         <p:nvPicPr>
-          <p:cNvPr id="281" name="pasted-image.png" descr="pasted-image.png"/>
+          <p:cNvPr id="278" name="pasted-image.pdf" descr="pasted-image.pdf"/>
           <p:cNvPicPr>
             <a:picLocks noChangeAspect="1"/>
           </p:cNvPicPr>
@@ -5957,9 +5795,9 @@
           </a:stretch>
         </p:blipFill>
         <p:spPr>
-          <a:xfrm>
-            <a:off x="4730750" y="2561067"/>
-            <a:ext cx="6057900" cy="5270501"/>
+          <a:xfrm rot="20682127">
+            <a:off x="10736960" y="84794"/>
+            <a:ext cx="1833028" cy="1738256"/>
           </a:xfrm>
           <a:prstGeom prst="rect">
             <a:avLst/>
@@ -5971,7 +5809,7 @@
       </p:pic>
       <p:pic>
         <p:nvPicPr>
-          <p:cNvPr id="282" name="pasted-image.pdf" descr="pasted-image.pdf"/>
+          <p:cNvPr id="279" name="pasted-image.pdf" descr="pasted-image.pdf"/>
           <p:cNvPicPr>
             <a:picLocks noChangeAspect="1"/>
           </p:cNvPicPr>
@@ -5987,8 +5825,8 @@
         </p:blipFill>
         <p:spPr>
           <a:xfrm>
-            <a:off x="594801" y="5387855"/>
-            <a:ext cx="4800433" cy="1697790"/>
+            <a:off x="3363401" y="3692137"/>
+            <a:ext cx="6277998" cy="2220366"/>
           </a:xfrm>
           <a:prstGeom prst="rect">
             <a:avLst/>
@@ -5998,9 +5836,189 @@
           </a:ln>
         </p:spPr>
       </p:pic>
+      <p:sp>
+        <p:nvSpPr>
+          <p:cNvPr id="280" name="Common:"/>
+          <p:cNvSpPr/>
+          <p:nvPr/>
+        </p:nvSpPr>
+        <p:spPr>
+          <a:xfrm>
+            <a:off x="1600549" y="6430433"/>
+            <a:ext cx="1494224" cy="584201"/>
+          </a:xfrm>
+          <a:prstGeom prst="rect">
+            <a:avLst/>
+          </a:prstGeom>
+          <a:ln w="12700">
+            <a:miter lim="400000"/>
+          </a:ln>
+          <a:extLst>
+            <a:ext uri="{C572A759-6A51-4108-AA02-DFA0A04FC94B}">
+              <ma14:wrappingTextBoxFlag xmlns:ma14="http://schemas.microsoft.com/office/mac/drawingml/2011/main" val="1"/>
+            </a:ext>
+          </a:extLst>
+        </p:spPr>
+        <p:txBody>
+          <a:bodyPr wrap="none" lIns="50800" tIns="50800" rIns="50800" bIns="50800" anchor="ctr">
+            <a:spAutoFit/>
+          </a:bodyPr>
+          <a:lstStyle/>
+          <a:p>
+            <a:pPr/>
+            <a:r>
+              <a:t>Common:</a:t>
+            </a:r>
+          </a:p>
+        </p:txBody>
+      </p:sp>
+      <p:sp>
+        <p:nvSpPr>
+          <p:cNvPr id="281" name="Anode, positieve pinnen met elkaar verbonden"/>
+          <p:cNvSpPr/>
+          <p:nvPr/>
+        </p:nvSpPr>
+        <p:spPr>
+          <a:xfrm>
+            <a:off x="3391249" y="6430433"/>
+            <a:ext cx="6628331" cy="584201"/>
+          </a:xfrm>
+          <a:prstGeom prst="rect">
+            <a:avLst/>
+          </a:prstGeom>
+          <a:ln w="12700">
+            <a:miter lim="400000"/>
+          </a:ln>
+          <a:extLst>
+            <a:ext uri="{C572A759-6A51-4108-AA02-DFA0A04FC94B}">
+              <ma14:wrappingTextBoxFlag xmlns:ma14="http://schemas.microsoft.com/office/mac/drawingml/2011/main" val="1"/>
+            </a:ext>
+          </a:extLst>
+        </p:spPr>
+        <p:txBody>
+          <a:bodyPr wrap="none" lIns="50800" tIns="50800" rIns="50800" bIns="50800" anchor="ctr">
+            <a:spAutoFit/>
+          </a:bodyPr>
+          <a:lstStyle/>
+          <a:p>
+            <a:pPr/>
+            <a:r>
+              <a:t>Anode, positieve pinnen met elkaar verbonden</a:t>
+            </a:r>
+          </a:p>
+        </p:txBody>
+      </p:sp>
+      <p:sp>
+        <p:nvSpPr>
+          <p:cNvPr id="282" name="Kathode, negatief pinnen met elkaar verbonden"/>
+          <p:cNvSpPr/>
+          <p:nvPr/>
+        </p:nvSpPr>
+        <p:spPr>
+          <a:xfrm>
+            <a:off x="3391249" y="6925733"/>
+            <a:ext cx="6798921" cy="584201"/>
+          </a:xfrm>
+          <a:prstGeom prst="rect">
+            <a:avLst/>
+          </a:prstGeom>
+          <a:ln w="12700">
+            <a:miter lim="400000"/>
+          </a:ln>
+          <a:extLst>
+            <a:ext uri="{C572A759-6A51-4108-AA02-DFA0A04FC94B}">
+              <ma14:wrappingTextBoxFlag xmlns:ma14="http://schemas.microsoft.com/office/mac/drawingml/2011/main" val="1"/>
+            </a:ext>
+          </a:extLst>
+        </p:spPr>
+        <p:txBody>
+          <a:bodyPr wrap="none" lIns="50800" tIns="50800" rIns="50800" bIns="50800" anchor="ctr">
+            <a:spAutoFit/>
+          </a:bodyPr>
+          <a:lstStyle/>
+          <a:p>
+            <a:pPr/>
+            <a:r>
+              <a:t>Kathode, negatief pinnen met elkaar verbonden</a:t>
+            </a:r>
+          </a:p>
+        </p:txBody>
+      </p:sp>
+      <p:sp>
+        <p:nvSpPr>
+          <p:cNvPr id="283" name="Kathode = Negatief"/>
+          <p:cNvSpPr/>
+          <p:nvPr/>
+        </p:nvSpPr>
+        <p:spPr>
+          <a:xfrm>
+            <a:off x="9779349" y="2247899"/>
+            <a:ext cx="2980222" cy="584201"/>
+          </a:xfrm>
+          <a:prstGeom prst="rect">
+            <a:avLst/>
+          </a:prstGeom>
+          <a:ln w="12700">
+            <a:miter lim="400000"/>
+          </a:ln>
+          <a:extLst>
+            <a:ext uri="{C572A759-6A51-4108-AA02-DFA0A04FC94B}">
+              <ma14:wrappingTextBoxFlag xmlns:ma14="http://schemas.microsoft.com/office/mac/drawingml/2011/main" val="1"/>
+            </a:ext>
+          </a:extLst>
+        </p:spPr>
+        <p:txBody>
+          <a:bodyPr wrap="none" lIns="50800" tIns="50800" rIns="50800" bIns="50800" anchor="ctr">
+            <a:spAutoFit/>
+          </a:bodyPr>
+          <a:lstStyle/>
+          <a:p>
+            <a:pPr/>
+            <a:r>
+              <a:t>Kathode = Negatief</a:t>
+            </a:r>
+          </a:p>
+        </p:txBody>
+      </p:sp>
+      <p:sp>
+        <p:nvSpPr>
+          <p:cNvPr id="284" name="Anode = Positief"/>
+          <p:cNvSpPr/>
+          <p:nvPr/>
+        </p:nvSpPr>
+        <p:spPr>
+          <a:xfrm>
+            <a:off x="9779349" y="2747433"/>
+            <a:ext cx="2557433" cy="584201"/>
+          </a:xfrm>
+          <a:prstGeom prst="rect">
+            <a:avLst/>
+          </a:prstGeom>
+          <a:ln w="12700">
+            <a:miter lim="400000"/>
+          </a:ln>
+          <a:extLst>
+            <a:ext uri="{C572A759-6A51-4108-AA02-DFA0A04FC94B}">
+              <ma14:wrappingTextBoxFlag xmlns:ma14="http://schemas.microsoft.com/office/mac/drawingml/2011/main" val="1"/>
+            </a:ext>
+          </a:extLst>
+        </p:spPr>
+        <p:txBody>
+          <a:bodyPr wrap="none" lIns="50800" tIns="50800" rIns="50800" bIns="50800" anchor="ctr">
+            <a:spAutoFit/>
+          </a:bodyPr>
+          <a:lstStyle/>
+          <a:p>
+            <a:pPr/>
+            <a:r>
+              <a:t>Anode = Positief</a:t>
+            </a:r>
+          </a:p>
+        </p:txBody>
+      </p:sp>
       <p:pic>
         <p:nvPicPr>
-          <p:cNvPr id="283" name="pasted-image.pdf" descr="pasted-image.pdf"/>
+          <p:cNvPr id="285" name="pasted-image.pdf" descr="pasted-image.pdf"/>
           <p:cNvPicPr>
             <a:picLocks noChangeAspect="1"/>
           </p:cNvPicPr>
@@ -6018,35 +6036,6 @@
           <a:xfrm>
             <a:off x="262693" y="7717069"/>
             <a:ext cx="1555320" cy="1909830"/>
-          </a:xfrm>
-          <a:prstGeom prst="rect">
-            <a:avLst/>
-          </a:prstGeom>
-          <a:ln w="12700">
-            <a:miter lim="400000"/>
-          </a:ln>
-        </p:spPr>
-      </p:pic>
-      <p:pic>
-        <p:nvPicPr>
-          <p:cNvPr id="284" name="pasted-image.pdf" descr="pasted-image.pdf"/>
-          <p:cNvPicPr>
-            <a:picLocks noChangeAspect="1"/>
-          </p:cNvPicPr>
-          <p:nvPr/>
-        </p:nvPicPr>
-        <p:blipFill>
-          <a:blip r:embed="rId7">
-            <a:extLst/>
-          </a:blip>
-          <a:stretch>
-            <a:fillRect/>
-          </a:stretch>
-        </p:blipFill>
-        <p:spPr>
-          <a:xfrm rot="20682127">
-            <a:off x="10736960" y="84794"/>
-            <a:ext cx="1833028" cy="1738256"/>
           </a:xfrm>
           <a:prstGeom prst="rect">
             <a:avLst/>
@@ -6084,7 +6073,7 @@
       </p:grpSpPr>
       <p:sp>
         <p:nvSpPr>
-          <p:cNvPr id="286" name="Rechthoek"/>
+          <p:cNvPr id="287" name="Rechthoek"/>
           <p:cNvSpPr/>
           <p:nvPr/>
         </p:nvSpPr>
@@ -6123,7 +6112,7 @@
       </p:sp>
       <p:pic>
         <p:nvPicPr>
-          <p:cNvPr id="287" name="Lijn" descr="Lijn"/>
+          <p:cNvPr id="288" name="Lijn" descr="Lijn"/>
           <p:cNvPicPr>
             <a:picLocks noChangeAspect="0"/>
           </p:cNvPicPr>
@@ -6155,7 +6144,7 @@
       </p:pic>
       <p:sp>
         <p:nvSpPr>
-          <p:cNvPr id="289" name="HT16K33"/>
+          <p:cNvPr id="290" name="Segment Display"/>
           <p:cNvSpPr/>
           <p:nvPr>
             <p:ph type="title"/>
@@ -6190,14 +6179,14 @@
           <a:p>
             <a:pPr/>
             <a:r>
-              <a:t>HT16K33</a:t>
+              <a:t>Segment Display</a:t>
             </a:r>
           </a:p>
         </p:txBody>
       </p:sp>
       <p:pic>
         <p:nvPicPr>
-          <p:cNvPr id="290" name="pasted-image.pdf" descr="pasted-image.pdf"/>
+          <p:cNvPr id="291" name="pasted-image.pdf" descr="pasted-image.pdf"/>
           <p:cNvPicPr>
             <a:picLocks noChangeAspect="1"/>
           </p:cNvPicPr>
@@ -6227,7 +6216,7 @@
       </p:pic>
       <p:sp>
         <p:nvSpPr>
-          <p:cNvPr id="291" name="Defusable Alarm Clock met Arduino"/>
+          <p:cNvPr id="292" name="Defusable Alarm Clock met Arduino"/>
           <p:cNvSpPr/>
           <p:nvPr/>
         </p:nvSpPr>
@@ -6281,7 +6270,7 @@
       </p:sp>
       <p:pic>
         <p:nvPicPr>
-          <p:cNvPr id="292" name="pasted-image.png" descr="pasted-image.png"/>
+          <p:cNvPr id="293" name="pasted-image.png" descr="pasted-image.png"/>
           <p:cNvPicPr>
             <a:picLocks noChangeAspect="1"/>
           </p:cNvPicPr>
@@ -6297,8 +6286,8 @@
         </p:blipFill>
         <p:spPr>
           <a:xfrm>
-            <a:off x="2347872" y="2189334"/>
-            <a:ext cx="8309056" cy="6475003"/>
+            <a:off x="4730750" y="2561067"/>
+            <a:ext cx="6057900" cy="5270501"/>
           </a:xfrm>
           <a:prstGeom prst="rect">
             <a:avLst/>
@@ -6310,7 +6299,7 @@
       </p:pic>
       <p:pic>
         <p:nvPicPr>
-          <p:cNvPr id="293" name="pasted-image.pdf" descr="pasted-image.pdf"/>
+          <p:cNvPr id="294" name="pasted-image.pdf" descr="pasted-image.pdf"/>
           <p:cNvPicPr>
             <a:picLocks noChangeAspect="1"/>
           </p:cNvPicPr>
@@ -6325,9 +6314,9 @@
           </a:stretch>
         </p:blipFill>
         <p:spPr>
-          <a:xfrm rot="20682127">
-            <a:off x="10736960" y="84794"/>
-            <a:ext cx="1833028" cy="1738256"/>
+          <a:xfrm>
+            <a:off x="594801" y="5387855"/>
+            <a:ext cx="4800433" cy="1697790"/>
           </a:xfrm>
           <a:prstGeom prst="rect">
             <a:avLst/>
@@ -6339,7 +6328,7 @@
       </p:pic>
       <p:pic>
         <p:nvPicPr>
-          <p:cNvPr id="294" name="pasted-image.pdf" descr="pasted-image.pdf"/>
+          <p:cNvPr id="295" name="pasted-image.pdf" descr="pasted-image.pdf"/>
           <p:cNvPicPr>
             <a:picLocks noChangeAspect="1"/>
           </p:cNvPicPr>
@@ -6357,6 +6346,35 @@
           <a:xfrm>
             <a:off x="262693" y="7717069"/>
             <a:ext cx="1555320" cy="1909830"/>
+          </a:xfrm>
+          <a:prstGeom prst="rect">
+            <a:avLst/>
+          </a:prstGeom>
+          <a:ln w="12700">
+            <a:miter lim="400000"/>
+          </a:ln>
+        </p:spPr>
+      </p:pic>
+      <p:pic>
+        <p:nvPicPr>
+          <p:cNvPr id="296" name="pasted-image.pdf" descr="pasted-image.pdf"/>
+          <p:cNvPicPr>
+            <a:picLocks noChangeAspect="1"/>
+          </p:cNvPicPr>
+          <p:nvPr/>
+        </p:nvPicPr>
+        <p:blipFill>
+          <a:blip r:embed="rId7">
+            <a:extLst/>
+          </a:blip>
+          <a:stretch>
+            <a:fillRect/>
+          </a:stretch>
+        </p:blipFill>
+        <p:spPr>
+          <a:xfrm rot="20682127">
+            <a:off x="10736960" y="84794"/>
+            <a:ext cx="1833028" cy="1738256"/>
           </a:xfrm>
           <a:prstGeom prst="rect">
             <a:avLst/>
@@ -6394,7 +6412,7 @@
       </p:grpSpPr>
       <p:sp>
         <p:nvSpPr>
-          <p:cNvPr id="296" name="Rechthoek"/>
+          <p:cNvPr id="298" name="Rechthoek"/>
           <p:cNvSpPr/>
           <p:nvPr/>
         </p:nvSpPr>
@@ -6433,7 +6451,7 @@
       </p:sp>
       <p:pic>
         <p:nvPicPr>
-          <p:cNvPr id="297" name="Lijn" descr="Lijn"/>
+          <p:cNvPr id="299" name="Lijn" descr="Lijn"/>
           <p:cNvPicPr>
             <a:picLocks noChangeAspect="0"/>
           </p:cNvPicPr>
@@ -6465,7 +6483,7 @@
       </p:pic>
       <p:sp>
         <p:nvSpPr>
-          <p:cNvPr id="299" name="HT16K33 en Segment Display"/>
+          <p:cNvPr id="301" name="HT16K33"/>
           <p:cNvSpPr/>
           <p:nvPr>
             <p:ph type="title"/>
@@ -6500,14 +6518,14 @@
           <a:p>
             <a:pPr/>
             <a:r>
-              <a:t>HT16K33 en Segment Display</a:t>
+              <a:t>HT16K33</a:t>
             </a:r>
           </a:p>
         </p:txBody>
       </p:sp>
       <p:pic>
         <p:nvPicPr>
-          <p:cNvPr id="300" name="pasted-image.pdf" descr="pasted-image.pdf"/>
+          <p:cNvPr id="302" name="pasted-image.pdf" descr="pasted-image.pdf"/>
           <p:cNvPicPr>
             <a:picLocks noChangeAspect="1"/>
           </p:cNvPicPr>
@@ -6537,7 +6555,7 @@
       </p:pic>
       <p:sp>
         <p:nvSpPr>
-          <p:cNvPr id="301" name="Defusable Alarm Clock met Arduino"/>
+          <p:cNvPr id="303" name="Defusable Alarm Clock met Arduino"/>
           <p:cNvSpPr/>
           <p:nvPr/>
         </p:nvSpPr>
@@ -6589,9 +6607,319 @@
           </a:p>
         </p:txBody>
       </p:sp>
+      <p:pic>
+        <p:nvPicPr>
+          <p:cNvPr id="304" name="pasted-image.png" descr="pasted-image.png"/>
+          <p:cNvPicPr>
+            <a:picLocks noChangeAspect="1"/>
+          </p:cNvPicPr>
+          <p:nvPr/>
+        </p:nvPicPr>
+        <p:blipFill>
+          <a:blip r:embed="rId4">
+            <a:extLst/>
+          </a:blip>
+          <a:stretch>
+            <a:fillRect/>
+          </a:stretch>
+        </p:blipFill>
+        <p:spPr>
+          <a:xfrm>
+            <a:off x="2347872" y="2189334"/>
+            <a:ext cx="8309056" cy="6475003"/>
+          </a:xfrm>
+          <a:prstGeom prst="rect">
+            <a:avLst/>
+          </a:prstGeom>
+          <a:ln w="12700">
+            <a:miter lim="400000"/>
+          </a:ln>
+        </p:spPr>
+      </p:pic>
+      <p:pic>
+        <p:nvPicPr>
+          <p:cNvPr id="305" name="pasted-image.pdf" descr="pasted-image.pdf"/>
+          <p:cNvPicPr>
+            <a:picLocks noChangeAspect="1"/>
+          </p:cNvPicPr>
+          <p:nvPr/>
+        </p:nvPicPr>
+        <p:blipFill>
+          <a:blip r:embed="rId5">
+            <a:extLst/>
+          </a:blip>
+          <a:stretch>
+            <a:fillRect/>
+          </a:stretch>
+        </p:blipFill>
+        <p:spPr>
+          <a:xfrm rot="20682127">
+            <a:off x="10736960" y="84794"/>
+            <a:ext cx="1833028" cy="1738256"/>
+          </a:xfrm>
+          <a:prstGeom prst="rect">
+            <a:avLst/>
+          </a:prstGeom>
+          <a:ln w="12700">
+            <a:miter lim="400000"/>
+          </a:ln>
+        </p:spPr>
+      </p:pic>
+      <p:pic>
+        <p:nvPicPr>
+          <p:cNvPr id="306" name="pasted-image.pdf" descr="pasted-image.pdf"/>
+          <p:cNvPicPr>
+            <a:picLocks noChangeAspect="1"/>
+          </p:cNvPicPr>
+          <p:nvPr/>
+        </p:nvPicPr>
+        <p:blipFill>
+          <a:blip r:embed="rId6">
+            <a:extLst/>
+          </a:blip>
+          <a:stretch>
+            <a:fillRect/>
+          </a:stretch>
+        </p:blipFill>
+        <p:spPr>
+          <a:xfrm>
+            <a:off x="262693" y="7717069"/>
+            <a:ext cx="1555320" cy="1909830"/>
+          </a:xfrm>
+          <a:prstGeom prst="rect">
+            <a:avLst/>
+          </a:prstGeom>
+          <a:ln w="12700">
+            <a:miter lim="400000"/>
+          </a:ln>
+        </p:spPr>
+      </p:pic>
+    </p:spTree>
+  </p:cSld>
+  <p:clrMapOvr>
+    <a:masterClrMapping/>
+  </p:clrMapOvr>
+  <p:transition xmlns:p14="http://schemas.microsoft.com/office/powerpoint/2010/main" spd="med" advClick="1"/>
+</p:sld>
+</file>
+
+<file path=ppt/slides/slide17.xml><?xml version="1.0" encoding="utf-8"?>
+<p:sld xmlns:a="http://schemas.openxmlformats.org/drawingml/2006/main" xmlns:r="http://schemas.openxmlformats.org/officeDocument/2006/relationships" xmlns:p="http://schemas.openxmlformats.org/presentationml/2006/main" showMasterSp="1" showMasterPhAnim="1">
+  <p:cSld>
+    <p:spTree>
+      <p:nvGrpSpPr>
+        <p:cNvPr id="1" name=""/>
+        <p:cNvGrpSpPr/>
+        <p:nvPr/>
+      </p:nvGrpSpPr>
+      <p:grpSpPr>
+        <a:xfrm>
+          <a:off x="0" y="0"/>
+          <a:ext cx="0" cy="0"/>
+          <a:chOff x="0" y="0"/>
+          <a:chExt cx="0" cy="0"/>
+        </a:xfrm>
+      </p:grpSpPr>
+      <p:sp>
+        <p:nvSpPr>
+          <p:cNvPr id="308" name="Rechthoek"/>
+          <p:cNvSpPr/>
+          <p:nvPr/>
+        </p:nvSpPr>
+        <p:spPr>
+          <a:xfrm>
+            <a:off x="-6351" y="-993"/>
+            <a:ext cx="13017501" cy="1909830"/>
+          </a:xfrm>
+          <a:prstGeom prst="rect">
+            <a:avLst/>
+          </a:prstGeom>
+          <a:solidFill>
+            <a:srgbClr val="376CAD"/>
+          </a:solidFill>
+          <a:ln w="12700">
+            <a:miter lim="400000"/>
+          </a:ln>
+        </p:spPr>
+        <p:txBody>
+          <a:bodyPr lIns="50800" tIns="50800" rIns="50800" bIns="50800" anchor="ctr"/>
+          <a:lstStyle/>
+          <a:p>
+            <a:pPr algn="ctr">
+              <a:spcBef>
+                <a:spcPts val="0"/>
+              </a:spcBef>
+              <a:defRPr i="0" spc="0" sz="2400">
+                <a:latin typeface="DIN Alternate"/>
+                <a:ea typeface="DIN Alternate"/>
+                <a:cs typeface="DIN Alternate"/>
+                <a:sym typeface="DIN Alternate"/>
+              </a:defRPr>
+            </a:pPr>
+          </a:p>
+        </p:txBody>
+      </p:sp>
+      <p:pic>
+        <p:nvPicPr>
+          <p:cNvPr id="309" name="Lijn" descr="Lijn"/>
+          <p:cNvPicPr>
+            <a:picLocks noChangeAspect="0"/>
+          </p:cNvPicPr>
+          <p:nvPr>
+            <p:ph type="body" idx="13"/>
+          </p:nvPr>
+        </p:nvPicPr>
+        <p:blipFill>
+          <a:blip r:embed="rId2">
+            <a:extLst/>
+          </a:blip>
+          <a:stretch>
+            <a:fillRect/>
+          </a:stretch>
+        </p:blipFill>
+        <p:spPr>
+          <a:xfrm>
+            <a:off x="520700" y="1524000"/>
+            <a:ext cx="11963400" cy="101600"/>
+          </a:xfrm>
+          <a:prstGeom prst="rect">
+            <a:avLst/>
+          </a:prstGeom>
+          <a:ln w="9525" cap="flat">
+            <a:noFill/>
+            <a:prstDash val="solid"/>
+          </a:ln>
+        </p:spPr>
+      </p:pic>
+      <p:sp>
+        <p:nvSpPr>
+          <p:cNvPr id="311" name="HT16K33 en Segment Display"/>
+          <p:cNvSpPr/>
+          <p:nvPr>
+            <p:ph type="title"/>
+          </p:nvPr>
+        </p:nvSpPr>
+        <p:spPr>
+          <a:prstGeom prst="rect">
+            <a:avLst/>
+          </a:prstGeom>
+        </p:spPr>
+        <p:txBody>
+          <a:bodyPr/>
+          <a:lstStyle>
+            <a:lvl1pPr defTabSz="182880">
+              <a:lnSpc>
+                <a:spcPct val="120000"/>
+              </a:lnSpc>
+              <a:spcBef>
+                <a:spcPts val="0"/>
+              </a:spcBef>
+              <a:defRPr cap="none" sz="5760">
+                <a:solidFill>
+                  <a:srgbClr val="FFFFFF"/>
+                </a:solidFill>
+                <a:latin typeface="Rhyolite"/>
+                <a:ea typeface="Rhyolite"/>
+                <a:cs typeface="Rhyolite"/>
+                <a:sym typeface="Rhyolite"/>
+              </a:defRPr>
+            </a:lvl1pPr>
+          </a:lstStyle>
+          <a:p>
+            <a:pPr/>
+            <a:r>
+              <a:t>HT16K33 en Segment Display</a:t>
+            </a:r>
+          </a:p>
+        </p:txBody>
+      </p:sp>
+      <p:pic>
+        <p:nvPicPr>
+          <p:cNvPr id="312" name="pasted-image.pdf" descr="pasted-image.pdf"/>
+          <p:cNvPicPr>
+            <a:picLocks noChangeAspect="1"/>
+          </p:cNvPicPr>
+          <p:nvPr/>
+        </p:nvPicPr>
+        <p:blipFill>
+          <a:blip r:embed="rId3">
+            <a:extLst/>
+          </a:blip>
+          <a:srcRect l="1610" t="60642" r="1610" b="17406"/>
+          <a:stretch>
+            <a:fillRect/>
+          </a:stretch>
+        </p:blipFill>
+        <p:spPr>
+          <a:xfrm>
+            <a:off x="-6548" y="8842639"/>
+            <a:ext cx="13017963" cy="915724"/>
+          </a:xfrm>
+          <a:prstGeom prst="rect">
+            <a:avLst/>
+          </a:prstGeom>
+          <a:ln w="12700">
+            <a:miter lim="400000"/>
+          </a:ln>
+        </p:spPr>
+      </p:pic>
+      <p:sp>
+        <p:nvSpPr>
+          <p:cNvPr id="313" name="Defusable Alarm Clock met Arduino"/>
+          <p:cNvSpPr/>
+          <p:nvPr/>
+        </p:nvSpPr>
+        <p:spPr>
+          <a:xfrm>
+            <a:off x="6030689" y="8944834"/>
+            <a:ext cx="6736995" cy="711201"/>
+          </a:xfrm>
+          <a:prstGeom prst="rect">
+            <a:avLst/>
+          </a:prstGeom>
+          <a:ln w="12700">
+            <a:miter lim="400000"/>
+          </a:ln>
+          <a:extLst>
+            <a:ext uri="{C572A759-6A51-4108-AA02-DFA0A04FC94B}">
+              <ma14:wrappingTextBoxFlag xmlns:ma14="http://schemas.microsoft.com/office/mac/drawingml/2011/main" val="1"/>
+            </a:ext>
+          </a:extLst>
+        </p:spPr>
+        <p:txBody>
+          <a:bodyPr wrap="none" lIns="50800" tIns="50800" rIns="50800" bIns="50800" anchor="ctr">
+            <a:spAutoFit/>
+          </a:bodyPr>
+          <a:lstStyle>
+            <a:lvl1pPr algn="r" defTabSz="457200">
+              <a:lnSpc>
+                <a:spcPct val="120000"/>
+              </a:lnSpc>
+              <a:spcBef>
+                <a:spcPts val="0"/>
+              </a:spcBef>
+              <a:defRPr i="0" spc="0" sz="4800">
+                <a:solidFill>
+                  <a:srgbClr val="FFFFFF"/>
+                </a:solidFill>
+                <a:latin typeface="Rhyolite"/>
+                <a:ea typeface="Rhyolite"/>
+                <a:cs typeface="Rhyolite"/>
+                <a:sym typeface="Rhyolite"/>
+              </a:defRPr>
+            </a:lvl1pPr>
+          </a:lstStyle>
+          <a:p>
+            <a:pPr/>
+            <a:r>
+              <a:t>Defusable Alarm Clock met Arduino</a:t>
+            </a:r>
+          </a:p>
+        </p:txBody>
+      </p:sp>
       <p:grpSp>
         <p:nvGrpSpPr>
-          <p:cNvPr id="304" name="pasted-image.png"/>
+          <p:cNvPr id="316" name="pasted-image.png"/>
           <p:cNvGrpSpPr/>
           <p:nvPr/>
         </p:nvGrpSpPr>
@@ -6605,7 +6933,7 @@
         </p:grpSpPr>
         <p:pic>
           <p:nvPicPr>
-            <p:cNvPr id="303" name="pasted-image.png" descr="pasted-image.png"/>
+            <p:cNvPr id="315" name="pasted-image.png" descr="pasted-image.png"/>
             <p:cNvPicPr>
               <a:picLocks noChangeAspect="1"/>
             </p:cNvPicPr>
@@ -6635,7 +6963,7 @@
         </p:pic>
         <p:pic>
           <p:nvPicPr>
-            <p:cNvPr id="302" name="pasted-image.png" descr="pasted-image.png"/>
+            <p:cNvPr id="314" name="pasted-image.png" descr="pasted-image.png"/>
             <p:cNvPicPr>
               <a:picLocks noChangeAspect="0"/>
             </p:cNvPicPr>
@@ -6663,7 +6991,7 @@
       </p:grpSp>
       <p:pic>
         <p:nvPicPr>
-          <p:cNvPr id="305" name="pasted-image.pdf" descr="pasted-image.pdf"/>
+          <p:cNvPr id="317" name="pasted-image.pdf" descr="pasted-image.pdf"/>
           <p:cNvPicPr>
             <a:picLocks noChangeAspect="1"/>
           </p:cNvPicPr>
@@ -6692,7 +7020,7 @@
       </p:pic>
       <p:sp>
         <p:nvSpPr>
-          <p:cNvPr id="306" name="Sinken"/>
+          <p:cNvPr id="318" name="Sinken"/>
           <p:cNvSpPr/>
           <p:nvPr/>
         </p:nvSpPr>
@@ -6728,7 +7056,7 @@
       </p:sp>
       <p:sp>
         <p:nvSpPr>
-          <p:cNvPr id="307" name="Sourcen"/>
+          <p:cNvPr id="319" name="Sourcen"/>
           <p:cNvSpPr/>
           <p:nvPr/>
         </p:nvSpPr>
@@ -6764,7 +7092,7 @@
       </p:sp>
       <p:pic>
         <p:nvPicPr>
-          <p:cNvPr id="308" name="sourcen_sinken.png" descr="sourcen_sinken.png"/>
+          <p:cNvPr id="320" name="sourcen_sinken.png" descr="sourcen_sinken.png"/>
           <p:cNvPicPr>
             <a:picLocks noChangeAspect="1"/>
           </p:cNvPicPr>
@@ -6793,7 +7121,7 @@
       </p:pic>
       <p:pic>
         <p:nvPicPr>
-          <p:cNvPr id="309" name="pasted-image.pdf" descr="pasted-image.pdf"/>
+          <p:cNvPr id="321" name="pasted-image.pdf" descr="pasted-image.pdf"/>
           <p:cNvPicPr>
             <a:picLocks noChangeAspect="1"/>
           </p:cNvPicPr>
@@ -6822,7 +7150,7 @@
       </p:pic>
       <p:pic>
         <p:nvPicPr>
-          <p:cNvPr id="310" name="pasted-image.pdf" descr="pasted-image.pdf"/>
+          <p:cNvPr id="322" name="pasted-image.pdf" descr="pasted-image.pdf"/>
           <p:cNvPicPr>
             <a:picLocks noChangeAspect="1"/>
           </p:cNvPicPr>
@@ -6849,395 +7177,6 @@
           </a:ln>
         </p:spPr>
       </p:pic>
-    </p:spTree>
-  </p:cSld>
-  <p:clrMapOvr>
-    <a:masterClrMapping/>
-  </p:clrMapOvr>
-  <p:transition xmlns:p14="http://schemas.microsoft.com/office/powerpoint/2010/main" spd="med" advClick="1"/>
-</p:sld>
-</file>
-
-<file path=ppt/slides/slide17.xml><?xml version="1.0" encoding="utf-8"?>
-<p:sld xmlns:a="http://schemas.openxmlformats.org/drawingml/2006/main" xmlns:r="http://schemas.openxmlformats.org/officeDocument/2006/relationships" xmlns:p="http://schemas.openxmlformats.org/presentationml/2006/main" showMasterSp="1" showMasterPhAnim="1">
-  <p:cSld>
-    <p:spTree>
-      <p:nvGrpSpPr>
-        <p:cNvPr id="1" name=""/>
-        <p:cNvGrpSpPr/>
-        <p:nvPr/>
-      </p:nvGrpSpPr>
-      <p:grpSpPr>
-        <a:xfrm>
-          <a:off x="0" y="0"/>
-          <a:ext cx="0" cy="0"/>
-          <a:chOff x="0" y="0"/>
-          <a:chExt cx="0" cy="0"/>
-        </a:xfrm>
-      </p:grpSpPr>
-      <p:sp>
-        <p:nvSpPr>
-          <p:cNvPr id="312" name="Rechthoek"/>
-          <p:cNvSpPr/>
-          <p:nvPr/>
-        </p:nvSpPr>
-        <p:spPr>
-          <a:xfrm>
-            <a:off x="-6351" y="-993"/>
-            <a:ext cx="13017501" cy="1909830"/>
-          </a:xfrm>
-          <a:prstGeom prst="rect">
-            <a:avLst/>
-          </a:prstGeom>
-          <a:solidFill>
-            <a:srgbClr val="376CAD"/>
-          </a:solidFill>
-          <a:ln w="12700">
-            <a:miter lim="400000"/>
-          </a:ln>
-        </p:spPr>
-        <p:txBody>
-          <a:bodyPr lIns="50800" tIns="50800" rIns="50800" bIns="50800" anchor="ctr"/>
-          <a:lstStyle/>
-          <a:p>
-            <a:pPr algn="ctr">
-              <a:spcBef>
-                <a:spcPts val="0"/>
-              </a:spcBef>
-              <a:defRPr i="0" spc="0" sz="2400">
-                <a:latin typeface="DIN Alternate"/>
-                <a:ea typeface="DIN Alternate"/>
-                <a:cs typeface="DIN Alternate"/>
-                <a:sym typeface="DIN Alternate"/>
-              </a:defRPr>
-            </a:pPr>
-          </a:p>
-        </p:txBody>
-      </p:sp>
-      <p:pic>
-        <p:nvPicPr>
-          <p:cNvPr id="313" name="Lijn" descr="Lijn"/>
-          <p:cNvPicPr>
-            <a:picLocks noChangeAspect="0"/>
-          </p:cNvPicPr>
-          <p:nvPr>
-            <p:ph type="body" idx="13"/>
-          </p:nvPr>
-        </p:nvPicPr>
-        <p:blipFill>
-          <a:blip r:embed="rId2">
-            <a:extLst/>
-          </a:blip>
-          <a:stretch>
-            <a:fillRect/>
-          </a:stretch>
-        </p:blipFill>
-        <p:spPr>
-          <a:xfrm>
-            <a:off x="520700" y="1524000"/>
-            <a:ext cx="11963400" cy="101600"/>
-          </a:xfrm>
-          <a:prstGeom prst="rect">
-            <a:avLst/>
-          </a:prstGeom>
-          <a:ln w="9525" cap="flat">
-            <a:noFill/>
-            <a:prstDash val="solid"/>
-          </a:ln>
-        </p:spPr>
-      </p:pic>
-      <p:sp>
-        <p:nvSpPr>
-          <p:cNvPr id="315" name="HT16K33 en Segment Display"/>
-          <p:cNvSpPr/>
-          <p:nvPr>
-            <p:ph type="title"/>
-          </p:nvPr>
-        </p:nvSpPr>
-        <p:spPr>
-          <a:prstGeom prst="rect">
-            <a:avLst/>
-          </a:prstGeom>
-        </p:spPr>
-        <p:txBody>
-          <a:bodyPr/>
-          <a:lstStyle>
-            <a:lvl1pPr defTabSz="182880">
-              <a:lnSpc>
-                <a:spcPct val="120000"/>
-              </a:lnSpc>
-              <a:spcBef>
-                <a:spcPts val="0"/>
-              </a:spcBef>
-              <a:defRPr cap="none" sz="5760">
-                <a:solidFill>
-                  <a:srgbClr val="FFFFFF"/>
-                </a:solidFill>
-                <a:latin typeface="Rhyolite"/>
-                <a:ea typeface="Rhyolite"/>
-                <a:cs typeface="Rhyolite"/>
-                <a:sym typeface="Rhyolite"/>
-              </a:defRPr>
-            </a:lvl1pPr>
-          </a:lstStyle>
-          <a:p>
-            <a:pPr/>
-            <a:r>
-              <a:t>HT16K33 en Segment Display</a:t>
-            </a:r>
-          </a:p>
-        </p:txBody>
-      </p:sp>
-      <p:pic>
-        <p:nvPicPr>
-          <p:cNvPr id="316" name="pasted-image.pdf" descr="pasted-image.pdf"/>
-          <p:cNvPicPr>
-            <a:picLocks noChangeAspect="1"/>
-          </p:cNvPicPr>
-          <p:nvPr/>
-        </p:nvPicPr>
-        <p:blipFill>
-          <a:blip r:embed="rId3">
-            <a:extLst/>
-          </a:blip>
-          <a:srcRect l="1610" t="60642" r="1610" b="17406"/>
-          <a:stretch>
-            <a:fillRect/>
-          </a:stretch>
-        </p:blipFill>
-        <p:spPr>
-          <a:xfrm>
-            <a:off x="-6548" y="8842639"/>
-            <a:ext cx="13017963" cy="915724"/>
-          </a:xfrm>
-          <a:prstGeom prst="rect">
-            <a:avLst/>
-          </a:prstGeom>
-          <a:ln w="12700">
-            <a:miter lim="400000"/>
-          </a:ln>
-        </p:spPr>
-      </p:pic>
-      <p:sp>
-        <p:nvSpPr>
-          <p:cNvPr id="317" name="Defusable Alarm Clock met Arduino"/>
-          <p:cNvSpPr/>
-          <p:nvPr/>
-        </p:nvSpPr>
-        <p:spPr>
-          <a:xfrm>
-            <a:off x="6030689" y="8944834"/>
-            <a:ext cx="6736995" cy="711201"/>
-          </a:xfrm>
-          <a:prstGeom prst="rect">
-            <a:avLst/>
-          </a:prstGeom>
-          <a:ln w="12700">
-            <a:miter lim="400000"/>
-          </a:ln>
-          <a:extLst>
-            <a:ext uri="{C572A759-6A51-4108-AA02-DFA0A04FC94B}">
-              <ma14:wrappingTextBoxFlag xmlns:ma14="http://schemas.microsoft.com/office/mac/drawingml/2011/main" val="1"/>
-            </a:ext>
-          </a:extLst>
-        </p:spPr>
-        <p:txBody>
-          <a:bodyPr wrap="none" lIns="50800" tIns="50800" rIns="50800" bIns="50800" anchor="ctr">
-            <a:spAutoFit/>
-          </a:bodyPr>
-          <a:lstStyle>
-            <a:lvl1pPr algn="r" defTabSz="457200">
-              <a:lnSpc>
-                <a:spcPct val="120000"/>
-              </a:lnSpc>
-              <a:spcBef>
-                <a:spcPts val="0"/>
-              </a:spcBef>
-              <a:defRPr i="0" spc="0" sz="4800">
-                <a:solidFill>
-                  <a:srgbClr val="FFFFFF"/>
-                </a:solidFill>
-                <a:latin typeface="Rhyolite"/>
-                <a:ea typeface="Rhyolite"/>
-                <a:cs typeface="Rhyolite"/>
-                <a:sym typeface="Rhyolite"/>
-              </a:defRPr>
-            </a:lvl1pPr>
-          </a:lstStyle>
-          <a:p>
-            <a:pPr/>
-            <a:r>
-              <a:t>Defusable Alarm Clock met Arduino</a:t>
-            </a:r>
-          </a:p>
-        </p:txBody>
-      </p:sp>
-      <p:sp>
-        <p:nvSpPr>
-          <p:cNvPr id="318" name="Tip! Gebruik I2C_Scanner voorbeeld"/>
-          <p:cNvSpPr/>
-          <p:nvPr/>
-        </p:nvSpPr>
-        <p:spPr>
-          <a:xfrm>
-            <a:off x="4277660" y="2730499"/>
-            <a:ext cx="5347302" cy="584201"/>
-          </a:xfrm>
-          <a:prstGeom prst="rect">
-            <a:avLst/>
-          </a:prstGeom>
-          <a:ln w="12700">
-            <a:miter lim="400000"/>
-          </a:ln>
-          <a:extLst>
-            <a:ext uri="{C572A759-6A51-4108-AA02-DFA0A04FC94B}">
-              <ma14:wrappingTextBoxFlag xmlns:ma14="http://schemas.microsoft.com/office/mac/drawingml/2011/main" val="1"/>
-            </a:ext>
-          </a:extLst>
-        </p:spPr>
-        <p:txBody>
-          <a:bodyPr wrap="none" lIns="50800" tIns="50800" rIns="50800" bIns="50800" anchor="ctr">
-            <a:spAutoFit/>
-          </a:bodyPr>
-          <a:lstStyle/>
-          <a:p>
-            <a:pPr/>
-            <a:r>
-              <a:t>Tip! Gebruik I2C_Scanner voorbeeld</a:t>
-            </a:r>
-          </a:p>
-        </p:txBody>
-      </p:sp>
-      <p:pic>
-        <p:nvPicPr>
-          <p:cNvPr id="319" name="pasted-image.pdf" descr="pasted-image.pdf"/>
-          <p:cNvPicPr>
-            <a:picLocks noChangeAspect="1"/>
-          </p:cNvPicPr>
-          <p:nvPr/>
-        </p:nvPicPr>
-        <p:blipFill>
-          <a:blip r:embed="rId4">
-            <a:extLst/>
-          </a:blip>
-          <a:stretch>
-            <a:fillRect/>
-          </a:stretch>
-        </p:blipFill>
-        <p:spPr>
-          <a:xfrm rot="20682127">
-            <a:off x="10736960" y="84794"/>
-            <a:ext cx="1833028" cy="1738256"/>
-          </a:xfrm>
-          <a:prstGeom prst="rect">
-            <a:avLst/>
-          </a:prstGeom>
-          <a:ln w="12700">
-            <a:miter lim="400000"/>
-          </a:ln>
-        </p:spPr>
-      </p:pic>
-      <p:pic>
-        <p:nvPicPr>
-          <p:cNvPr id="320" name="pasted-image.pdf" descr="pasted-image.pdf"/>
-          <p:cNvPicPr>
-            <a:picLocks noChangeAspect="1"/>
-          </p:cNvPicPr>
-          <p:nvPr/>
-        </p:nvPicPr>
-        <p:blipFill>
-          <a:blip r:embed="rId5">
-            <a:extLst/>
-          </a:blip>
-          <a:stretch>
-            <a:fillRect/>
-          </a:stretch>
-        </p:blipFill>
-        <p:spPr>
-          <a:xfrm>
-            <a:off x="262693" y="7717069"/>
-            <a:ext cx="1555320" cy="1909830"/>
-          </a:xfrm>
-          <a:prstGeom prst="rect">
-            <a:avLst/>
-          </a:prstGeom>
-          <a:ln w="12700">
-            <a:miter lim="400000"/>
-          </a:ln>
-        </p:spPr>
-      </p:pic>
-      <p:sp>
-        <p:nvSpPr>
-          <p:cNvPr id="321" name="Library: BombDisplay.h / BombDisplay.cpp"/>
-          <p:cNvSpPr/>
-          <p:nvPr/>
-        </p:nvSpPr>
-        <p:spPr>
-          <a:xfrm>
-            <a:off x="3779865" y="3683000"/>
-            <a:ext cx="6342892" cy="584201"/>
-          </a:xfrm>
-          <a:prstGeom prst="rect">
-            <a:avLst/>
-          </a:prstGeom>
-          <a:ln w="12700">
-            <a:miter lim="400000"/>
-          </a:ln>
-          <a:extLst>
-            <a:ext uri="{C572A759-6A51-4108-AA02-DFA0A04FC94B}">
-              <ma14:wrappingTextBoxFlag xmlns:ma14="http://schemas.microsoft.com/office/mac/drawingml/2011/main" val="1"/>
-            </a:ext>
-          </a:extLst>
-        </p:spPr>
-        <p:txBody>
-          <a:bodyPr wrap="none" lIns="50800" tIns="50800" rIns="50800" bIns="50800" anchor="ctr">
-            <a:spAutoFit/>
-          </a:bodyPr>
-          <a:lstStyle/>
-          <a:p>
-            <a:pPr/>
-            <a:r>
-              <a:t>Library: BombDisplay.h / BombDisplay.cpp</a:t>
-            </a:r>
-          </a:p>
-        </p:txBody>
-      </p:sp>
-      <p:sp>
-        <p:nvSpPr>
-          <p:cNvPr id="322" name="Voorbeeld zonder library: Bomb_LCD_Direct"/>
-          <p:cNvSpPr/>
-          <p:nvPr/>
-        </p:nvSpPr>
-        <p:spPr>
-          <a:xfrm>
-            <a:off x="3673560" y="4584699"/>
-            <a:ext cx="6555502" cy="584201"/>
-          </a:xfrm>
-          <a:prstGeom prst="rect">
-            <a:avLst/>
-          </a:prstGeom>
-          <a:ln w="12700">
-            <a:miter lim="400000"/>
-          </a:ln>
-          <a:extLst>
-            <a:ext uri="{C572A759-6A51-4108-AA02-DFA0A04FC94B}">
-              <ma14:wrappingTextBoxFlag xmlns:ma14="http://schemas.microsoft.com/office/mac/drawingml/2011/main" val="1"/>
-            </a:ext>
-          </a:extLst>
-        </p:spPr>
-        <p:txBody>
-          <a:bodyPr wrap="none" lIns="50800" tIns="50800" rIns="50800" bIns="50800" anchor="ctr">
-            <a:spAutoFit/>
-          </a:bodyPr>
-          <a:lstStyle/>
-          <a:p>
-            <a:pPr/>
-            <a:r>
-              <a:t>Voorbeeld zonder library: Bomb_LCD_Direct</a:t>
-            </a:r>
-          </a:p>
-        </p:txBody>
-      </p:sp>
     </p:spTree>
   </p:cSld>
   <p:clrMapOvr>
@@ -7337,7 +7276,7 @@
       </p:pic>
       <p:sp>
         <p:nvSpPr>
-          <p:cNvPr id="327" name="Real Time Clock met DS3231"/>
+          <p:cNvPr id="327" name="HT16K33 en Segment Display"/>
           <p:cNvSpPr/>
           <p:nvPr>
             <p:ph type="title"/>
@@ -7372,7 +7311,7 @@
           <a:p>
             <a:pPr/>
             <a:r>
-              <a:t>Real Time Clock met DS3231</a:t>
+              <a:t>HT16K33 en Segment Display</a:t>
             </a:r>
           </a:p>
         </p:txBody>
@@ -7461,9 +7400,45 @@
           </a:p>
         </p:txBody>
       </p:sp>
+      <p:sp>
+        <p:nvSpPr>
+          <p:cNvPr id="330" name="Tip! Gebruik I2C_Scanner voorbeeld"/>
+          <p:cNvSpPr/>
+          <p:nvPr/>
+        </p:nvSpPr>
+        <p:spPr>
+          <a:xfrm>
+            <a:off x="4277660" y="2730499"/>
+            <a:ext cx="5347302" cy="584201"/>
+          </a:xfrm>
+          <a:prstGeom prst="rect">
+            <a:avLst/>
+          </a:prstGeom>
+          <a:ln w="12700">
+            <a:miter lim="400000"/>
+          </a:ln>
+          <a:extLst>
+            <a:ext uri="{C572A759-6A51-4108-AA02-DFA0A04FC94B}">
+              <ma14:wrappingTextBoxFlag xmlns:ma14="http://schemas.microsoft.com/office/mac/drawingml/2011/main" val="1"/>
+            </a:ext>
+          </a:extLst>
+        </p:spPr>
+        <p:txBody>
+          <a:bodyPr wrap="none" lIns="50800" tIns="50800" rIns="50800" bIns="50800" anchor="ctr">
+            <a:spAutoFit/>
+          </a:bodyPr>
+          <a:lstStyle/>
+          <a:p>
+            <a:pPr/>
+            <a:r>
+              <a:t>Tip! Gebruik I2C_Scanner voorbeeld</a:t>
+            </a:r>
+          </a:p>
+        </p:txBody>
+      </p:sp>
       <p:pic>
         <p:nvPicPr>
-          <p:cNvPr id="330" name="pasted-image.pdf" descr="pasted-image.pdf"/>
+          <p:cNvPr id="331" name="pasted-image.pdf" descr="pasted-image.pdf"/>
           <p:cNvPicPr>
             <a:picLocks noChangeAspect="1"/>
           </p:cNvPicPr>
@@ -7492,7 +7467,7 @@
       </p:pic>
       <p:pic>
         <p:nvPicPr>
-          <p:cNvPr id="331" name="pasted-image.pdf" descr="pasted-image.pdf"/>
+          <p:cNvPr id="332" name="pasted-image.pdf" descr="pasted-image.pdf"/>
           <p:cNvPicPr>
             <a:picLocks noChangeAspect="1"/>
           </p:cNvPicPr>
@@ -7521,14 +7496,14 @@
       </p:pic>
       <p:sp>
         <p:nvSpPr>
-          <p:cNvPr id="332" name="Tip! Gebruik RT_Clock voorbeeld"/>
-          <p:cNvSpPr/>
-          <p:nvPr/>
-        </p:nvSpPr>
-        <p:spPr>
-          <a:xfrm>
-            <a:off x="4061108" y="2654299"/>
-            <a:ext cx="4882584" cy="584201"/>
+          <p:cNvPr id="333" name="Library: BombDisplay.h / BombDisplay.cpp"/>
+          <p:cNvSpPr/>
+          <p:nvPr/>
+        </p:nvSpPr>
+        <p:spPr>
+          <a:xfrm>
+            <a:off x="3779865" y="3682999"/>
+            <a:ext cx="6342892" cy="584201"/>
           </a:xfrm>
           <a:prstGeom prst="rect">
             <a:avLst/>
@@ -7550,21 +7525,21 @@
           <a:p>
             <a:pPr/>
             <a:r>
-              <a:t>Tip! Gebruik RT_Clock voorbeeld</a:t>
-            </a:r>
-          </a:p>
-        </p:txBody>
-      </p:sp>
-      <p:sp>
-        <p:nvSpPr>
-          <p:cNvPr id="333" name="RTClib"/>
-          <p:cNvSpPr/>
-          <p:nvPr/>
-        </p:nvSpPr>
-        <p:spPr>
-          <a:xfrm>
-            <a:off x="4128341" y="3479800"/>
-            <a:ext cx="1141318" cy="584200"/>
+              <a:t>Library: BombDisplay.h / BombDisplay.cpp</a:t>
+            </a:r>
+          </a:p>
+        </p:txBody>
+      </p:sp>
+      <p:sp>
+        <p:nvSpPr>
+          <p:cNvPr id="334" name="Voorbeeld zonder library: Bomb_LCD_Direct"/>
+          <p:cNvSpPr/>
+          <p:nvPr/>
+        </p:nvSpPr>
+        <p:spPr>
+          <a:xfrm>
+            <a:off x="3673560" y="4584699"/>
+            <a:ext cx="6555502" cy="584201"/>
           </a:xfrm>
           <a:prstGeom prst="rect">
             <a:avLst/>
@@ -7586,7 +7561,7 @@
           <a:p>
             <a:pPr/>
             <a:r>
-              <a:t>RTClib</a:t>
+              <a:t>Voorbeeld zonder library: Bomb_LCD_Direct</a:t>
             </a:r>
           </a:p>
         </p:txBody>
@@ -7619,7 +7594,7 @@
       </p:grpSpPr>
       <p:sp>
         <p:nvSpPr>
-          <p:cNvPr id="335" name="Rechthoek"/>
+          <p:cNvPr id="336" name="Rechthoek"/>
           <p:cNvSpPr/>
           <p:nvPr/>
         </p:nvSpPr>
@@ -7658,7 +7633,7 @@
       </p:sp>
       <p:pic>
         <p:nvPicPr>
-          <p:cNvPr id="336" name="Lijn" descr="Lijn"/>
+          <p:cNvPr id="337" name="Lijn" descr="Lijn"/>
           <p:cNvPicPr>
             <a:picLocks noChangeAspect="0"/>
           </p:cNvPicPr>
@@ -7690,7 +7665,7 @@
       </p:pic>
       <p:sp>
         <p:nvSpPr>
-          <p:cNvPr id="338" name="Combinatie Broncode"/>
+          <p:cNvPr id="339" name="Real Time Clock met DS3231"/>
           <p:cNvSpPr/>
           <p:nvPr>
             <p:ph type="title"/>
@@ -7725,14 +7700,14 @@
           <a:p>
             <a:pPr/>
             <a:r>
-              <a:t>Combinatie Broncode</a:t>
+              <a:t>Real Time Clock met DS3231</a:t>
             </a:r>
           </a:p>
         </p:txBody>
       </p:sp>
       <p:pic>
         <p:nvPicPr>
-          <p:cNvPr id="339" name="pasted-image.pdf" descr="pasted-image.pdf"/>
+          <p:cNvPr id="340" name="pasted-image.pdf" descr="pasted-image.pdf"/>
           <p:cNvPicPr>
             <a:picLocks noChangeAspect="1"/>
           </p:cNvPicPr>
@@ -7762,7 +7737,7 @@
       </p:pic>
       <p:sp>
         <p:nvSpPr>
-          <p:cNvPr id="340" name="Defusable Alarm Clock met Arduino"/>
+          <p:cNvPr id="341" name="Defusable Alarm Clock met Arduino"/>
           <p:cNvSpPr/>
           <p:nvPr/>
         </p:nvSpPr>
@@ -7816,7 +7791,7 @@
       </p:sp>
       <p:pic>
         <p:nvPicPr>
-          <p:cNvPr id="341" name="pasted-image.pdf" descr="pasted-image.pdf"/>
+          <p:cNvPr id="342" name="pasted-image.pdf" descr="pasted-image.pdf"/>
           <p:cNvPicPr>
             <a:picLocks noChangeAspect="1"/>
           </p:cNvPicPr>
@@ -7845,7 +7820,7 @@
       </p:pic>
       <p:pic>
         <p:nvPicPr>
-          <p:cNvPr id="342" name="pasted-image.pdf" descr="pasted-image.pdf"/>
+          <p:cNvPr id="343" name="pasted-image.pdf" descr="pasted-image.pdf"/>
           <p:cNvPicPr>
             <a:picLocks noChangeAspect="1"/>
           </p:cNvPicPr>
@@ -7874,14 +7849,14 @@
       </p:pic>
       <p:sp>
         <p:nvSpPr>
-          <p:cNvPr id="343" name="MegaBomb voorbeeld"/>
-          <p:cNvSpPr/>
-          <p:nvPr/>
-        </p:nvSpPr>
-        <p:spPr>
-          <a:xfrm>
-            <a:off x="5166807" y="2095500"/>
-            <a:ext cx="3158369" cy="584201"/>
+          <p:cNvPr id="344" name="Tip! Gebruik RT_Clock voorbeeld"/>
+          <p:cNvSpPr/>
+          <p:nvPr/>
+        </p:nvSpPr>
+        <p:spPr>
+          <a:xfrm>
+            <a:off x="4061108" y="2654299"/>
+            <a:ext cx="4882584" cy="584201"/>
           </a:xfrm>
           <a:prstGeom prst="rect">
             <a:avLst/>
@@ -7903,21 +7878,21 @@
           <a:p>
             <a:pPr/>
             <a:r>
-              <a:t>MegaBomb voorbeeld</a:t>
-            </a:r>
-          </a:p>
-        </p:txBody>
-      </p:sp>
-      <p:sp>
-        <p:nvSpPr>
-          <p:cNvPr id="344" name="Main:…"/>
-          <p:cNvSpPr/>
-          <p:nvPr/>
-        </p:nvSpPr>
-        <p:spPr>
-          <a:xfrm>
-            <a:off x="2716349" y="2701263"/>
-            <a:ext cx="7572102" cy="2565401"/>
+              <a:t>Tip! Gebruik RT_Clock voorbeeld</a:t>
+            </a:r>
+          </a:p>
+        </p:txBody>
+      </p:sp>
+      <p:sp>
+        <p:nvSpPr>
+          <p:cNvPr id="345" name="RTClib"/>
+          <p:cNvSpPr/>
+          <p:nvPr/>
+        </p:nvSpPr>
+        <p:spPr>
+          <a:xfrm>
+            <a:off x="4128341" y="3479799"/>
+            <a:ext cx="1141318" cy="584201"/>
           </a:xfrm>
           <a:prstGeom prst="rect">
             <a:avLst/>
@@ -7939,176 +7914,7 @@
           <a:p>
             <a:pPr/>
             <a:r>
-              <a:t>Main: </a:t>
-            </a:r>
-          </a:p>
-          <a:p>
-            <a:pPr marL="411162" indent="-411162">
-              <a:buSzPct val="75000"/>
-              <a:buFont typeface="Zapf Dingbats"/>
-              <a:buChar char="-"/>
-            </a:pPr>
-            <a:r>
-              <a:t>roept vooral methodes in andere bestanden aan…</a:t>
-            </a:r>
-          </a:p>
-          <a:p>
-            <a:pPr marL="411162" indent="-411162">
-              <a:buSzPct val="75000"/>
-              <a:buFont typeface="Zapf Dingbats"/>
-              <a:buChar char="-"/>
-            </a:pPr>
-            <a:r>
-              <a:t>RTC object voor de real time clock</a:t>
-            </a:r>
-          </a:p>
-          <a:p>
-            <a:pPr marL="411162" indent="-411162">
-              <a:buSzPct val="75000"/>
-              <a:buFont typeface="Zapf Dingbats"/>
-              <a:buChar char="-"/>
-            </a:pPr>
-            <a:r>
-              <a:t>bombDisplay object voor Display (HTK16K33)</a:t>
-            </a:r>
-          </a:p>
-        </p:txBody>
-      </p:sp>
-      <p:sp>
-        <p:nvSpPr>
-          <p:cNvPr id="345" name="Helpers voor code voor:…"/>
-          <p:cNvSpPr/>
-          <p:nvPr/>
-        </p:nvSpPr>
-        <p:spPr>
-          <a:xfrm>
-            <a:off x="2716349" y="5419063"/>
-            <a:ext cx="3504225" cy="3225801"/>
-          </a:xfrm>
-          <a:prstGeom prst="rect">
-            <a:avLst/>
-          </a:prstGeom>
-          <a:ln w="12700">
-            <a:miter lim="400000"/>
-          </a:ln>
-          <a:extLst>
-            <a:ext uri="{C572A759-6A51-4108-AA02-DFA0A04FC94B}">
-              <ma14:wrappingTextBoxFlag xmlns:ma14="http://schemas.microsoft.com/office/mac/drawingml/2011/main" val="1"/>
-            </a:ext>
-          </a:extLst>
-        </p:spPr>
-        <p:txBody>
-          <a:bodyPr wrap="none" lIns="50800" tIns="50800" rIns="50800" bIns="50800" anchor="ctr">
-            <a:spAutoFit/>
-          </a:bodyPr>
-          <a:lstStyle/>
-          <a:p>
-            <a:pPr/>
-            <a:r>
-              <a:t>Helpers voor code voor:</a:t>
-            </a:r>
-          </a:p>
-          <a:p>
-            <a:pPr marL="411162" indent="-411162">
-              <a:buSzPct val="75000"/>
-              <a:buFont typeface="Zapf Dingbats"/>
-              <a:buChar char="-"/>
-            </a:pPr>
-            <a:r>
-              <a:t>Draden</a:t>
-            </a:r>
-          </a:p>
-          <a:p>
-            <a:pPr marL="411162" indent="-411162">
-              <a:buSzPct val="75000"/>
-              <a:buFont typeface="Zapf Dingbats"/>
-              <a:buChar char="-"/>
-            </a:pPr>
-            <a:r>
-              <a:t>Knoppen</a:t>
-            </a:r>
-          </a:p>
-          <a:p>
-            <a:pPr marL="411162" indent="-411162">
-              <a:buSzPct val="75000"/>
-              <a:buFont typeface="Zapf Dingbats"/>
-              <a:buChar char="-"/>
-            </a:pPr>
-            <a:r>
-              <a:t>Buzzer</a:t>
-            </a:r>
-          </a:p>
-          <a:p>
-            <a:pPr marL="411162" indent="-411162">
-              <a:buSzPct val="75000"/>
-              <a:buFont typeface="Zapf Dingbats"/>
-              <a:buChar char="-"/>
-            </a:pPr>
-            <a:r>
-              <a:t>LED</a:t>
-            </a:r>
-          </a:p>
-        </p:txBody>
-      </p:sp>
-      <p:sp>
-        <p:nvSpPr>
-          <p:cNvPr id="346" name="Tilt sensor…"/>
-          <p:cNvSpPr/>
-          <p:nvPr/>
-        </p:nvSpPr>
-        <p:spPr>
-          <a:xfrm>
-            <a:off x="6831149" y="5749263"/>
-            <a:ext cx="4705313" cy="2565401"/>
-          </a:xfrm>
-          <a:prstGeom prst="rect">
-            <a:avLst/>
-          </a:prstGeom>
-          <a:ln w="12700">
-            <a:miter lim="400000"/>
-          </a:ln>
-          <a:extLst>
-            <a:ext uri="{C572A759-6A51-4108-AA02-DFA0A04FC94B}">
-              <ma14:wrappingTextBoxFlag xmlns:ma14="http://schemas.microsoft.com/office/mac/drawingml/2011/main" val="1"/>
-            </a:ext>
-          </a:extLst>
-        </p:spPr>
-        <p:txBody>
-          <a:bodyPr wrap="none" lIns="50800" tIns="50800" rIns="50800" bIns="50800" anchor="ctr">
-            <a:spAutoFit/>
-          </a:bodyPr>
-          <a:lstStyle/>
-          <a:p>
-            <a:pPr/>
-          </a:p>
-          <a:p>
-            <a:pPr marL="411162" indent="-411162">
-              <a:buSzPct val="75000"/>
-              <a:buFont typeface="Zapf Dingbats"/>
-              <a:buChar char="-"/>
-            </a:pPr>
-            <a:r>
-              <a:t>Tilt sensor</a:t>
-            </a:r>
-          </a:p>
-          <a:p>
-            <a:pPr marL="411162" indent="-411162">
-              <a:buSzPct val="75000"/>
-              <a:buFont typeface="Zapf Dingbats"/>
-              <a:buChar char="-"/>
-            </a:pPr>
-            <a:r>
-              <a:t>Tijd</a:t>
-            </a:r>
-          </a:p>
-          <a:p>
-            <a:pPr marL="411162" indent="-411162">
-              <a:buSzPct val="75000"/>
-              <a:buFont typeface="Zapf Dingbats"/>
-              <a:buChar char="-"/>
-            </a:pPr>
-            <a:r>
-              <a:t>pitches.h (tonen voor buzzer)</a:t>
+              <a:t>RTClib</a:t>
             </a:r>
           </a:p>
         </p:txBody>
@@ -8437,7 +8243,7 @@
         </p:blipFill>
         <p:spPr>
           <a:xfrm>
-            <a:off x="262693" y="7717068"/>
+            <a:off x="262693" y="7717069"/>
             <a:ext cx="1555320" cy="1909830"/>
           </a:xfrm>
           <a:prstGeom prst="rect">
@@ -8505,14 +8311,14 @@
       </p:grpSpPr>
       <p:sp>
         <p:nvSpPr>
-          <p:cNvPr id="348" name="Rechthoek"/>
+          <p:cNvPr id="347" name="Rechthoek"/>
           <p:cNvSpPr/>
           <p:nvPr/>
         </p:nvSpPr>
         <p:spPr>
           <a:xfrm>
             <a:off x="-6351" y="-993"/>
-            <a:ext cx="13017501" cy="4456114"/>
+            <a:ext cx="13017501" cy="1909830"/>
           </a:xfrm>
           <a:prstGeom prst="rect">
             <a:avLst/>
@@ -8544,11 +8350,13 @@
       </p:sp>
       <p:pic>
         <p:nvPicPr>
-          <p:cNvPr id="349" name="pasted-image.pdf" descr="pasted-image.pdf"/>
+          <p:cNvPr id="348" name="Lijn" descr="Lijn"/>
           <p:cNvPicPr>
-            <a:picLocks noChangeAspect="1"/>
+            <a:picLocks noChangeAspect="0"/>
           </p:cNvPicPr>
-          <p:nvPr/>
+          <p:nvPr>
+            <p:ph type="body" idx="13"/>
+          </p:nvPr>
         </p:nvPicPr>
         <p:blipFill>
           <a:blip r:embed="rId2">
@@ -8560,30 +8368,27 @@
         </p:blipFill>
         <p:spPr>
           <a:xfrm>
-            <a:off x="11184693" y="1094349"/>
-            <a:ext cx="1555320" cy="1909830"/>
-          </a:xfrm>
-          <a:prstGeom prst="rect">
-            <a:avLst/>
-          </a:prstGeom>
-          <a:ln w="12700">
-            <a:miter lim="400000"/>
+            <a:off x="520700" y="1524000"/>
+            <a:ext cx="11963400" cy="101600"/>
+          </a:xfrm>
+          <a:prstGeom prst="rect">
+            <a:avLst/>
+          </a:prstGeom>
+          <a:ln w="9525" cap="flat">
+            <a:noFill/>
+            <a:prstDash val="solid"/>
           </a:ln>
         </p:spPr>
       </p:pic>
       <p:sp>
         <p:nvSpPr>
-          <p:cNvPr id="350" name="Medio Mei verkrijgbaar"/>
+          <p:cNvPr id="350" name="Combinatie Broncode"/>
           <p:cNvSpPr/>
           <p:nvPr>
             <p:ph type="title"/>
           </p:nvPr>
         </p:nvSpPr>
         <p:spPr>
-          <a:xfrm>
-            <a:off x="571500" y="2512813"/>
-            <a:ext cx="11861801" cy="723901"/>
-          </a:xfrm>
           <a:prstGeom prst="rect">
             <a:avLst/>
           </a:prstGeom>
@@ -8612,7 +8417,7 @@
           <a:p>
             <a:pPr/>
             <a:r>
-              <a:t>Medio Mei verkrijgbaar</a:t>
+              <a:t>Combinatie Broncode</a:t>
             </a:r>
           </a:p>
         </p:txBody>
@@ -8620,6 +8425,529 @@
       <p:pic>
         <p:nvPicPr>
           <p:cNvPr id="351" name="pasted-image.pdf" descr="pasted-image.pdf"/>
+          <p:cNvPicPr>
+            <a:picLocks noChangeAspect="1"/>
+          </p:cNvPicPr>
+          <p:nvPr/>
+        </p:nvPicPr>
+        <p:blipFill>
+          <a:blip r:embed="rId3">
+            <a:extLst/>
+          </a:blip>
+          <a:srcRect l="1610" t="60642" r="1610" b="17406"/>
+          <a:stretch>
+            <a:fillRect/>
+          </a:stretch>
+        </p:blipFill>
+        <p:spPr>
+          <a:xfrm>
+            <a:off x="-6548" y="8842639"/>
+            <a:ext cx="13017963" cy="915724"/>
+          </a:xfrm>
+          <a:prstGeom prst="rect">
+            <a:avLst/>
+          </a:prstGeom>
+          <a:ln w="12700">
+            <a:miter lim="400000"/>
+          </a:ln>
+        </p:spPr>
+      </p:pic>
+      <p:sp>
+        <p:nvSpPr>
+          <p:cNvPr id="352" name="Defusable Alarm Clock met Arduino"/>
+          <p:cNvSpPr/>
+          <p:nvPr/>
+        </p:nvSpPr>
+        <p:spPr>
+          <a:xfrm>
+            <a:off x="6030689" y="8944834"/>
+            <a:ext cx="6736995" cy="711201"/>
+          </a:xfrm>
+          <a:prstGeom prst="rect">
+            <a:avLst/>
+          </a:prstGeom>
+          <a:ln w="12700">
+            <a:miter lim="400000"/>
+          </a:ln>
+          <a:extLst>
+            <a:ext uri="{C572A759-6A51-4108-AA02-DFA0A04FC94B}">
+              <ma14:wrappingTextBoxFlag xmlns:ma14="http://schemas.microsoft.com/office/mac/drawingml/2011/main" val="1"/>
+            </a:ext>
+          </a:extLst>
+        </p:spPr>
+        <p:txBody>
+          <a:bodyPr wrap="none" lIns="50800" tIns="50800" rIns="50800" bIns="50800" anchor="ctr">
+            <a:spAutoFit/>
+          </a:bodyPr>
+          <a:lstStyle>
+            <a:lvl1pPr algn="r" defTabSz="457200">
+              <a:lnSpc>
+                <a:spcPct val="120000"/>
+              </a:lnSpc>
+              <a:spcBef>
+                <a:spcPts val="0"/>
+              </a:spcBef>
+              <a:defRPr i="0" spc="0" sz="4800">
+                <a:solidFill>
+                  <a:srgbClr val="FFFFFF"/>
+                </a:solidFill>
+                <a:latin typeface="Rhyolite"/>
+                <a:ea typeface="Rhyolite"/>
+                <a:cs typeface="Rhyolite"/>
+                <a:sym typeface="Rhyolite"/>
+              </a:defRPr>
+            </a:lvl1pPr>
+          </a:lstStyle>
+          <a:p>
+            <a:pPr/>
+            <a:r>
+              <a:t>Defusable Alarm Clock met Arduino</a:t>
+            </a:r>
+          </a:p>
+        </p:txBody>
+      </p:sp>
+      <p:pic>
+        <p:nvPicPr>
+          <p:cNvPr id="353" name="pasted-image.pdf" descr="pasted-image.pdf"/>
+          <p:cNvPicPr>
+            <a:picLocks noChangeAspect="1"/>
+          </p:cNvPicPr>
+          <p:nvPr/>
+        </p:nvPicPr>
+        <p:blipFill>
+          <a:blip r:embed="rId4">
+            <a:extLst/>
+          </a:blip>
+          <a:stretch>
+            <a:fillRect/>
+          </a:stretch>
+        </p:blipFill>
+        <p:spPr>
+          <a:xfrm rot="20682127">
+            <a:off x="10736960" y="84794"/>
+            <a:ext cx="1833028" cy="1738256"/>
+          </a:xfrm>
+          <a:prstGeom prst="rect">
+            <a:avLst/>
+          </a:prstGeom>
+          <a:ln w="12700">
+            <a:miter lim="400000"/>
+          </a:ln>
+        </p:spPr>
+      </p:pic>
+      <p:pic>
+        <p:nvPicPr>
+          <p:cNvPr id="354" name="pasted-image.pdf" descr="pasted-image.pdf"/>
+          <p:cNvPicPr>
+            <a:picLocks noChangeAspect="1"/>
+          </p:cNvPicPr>
+          <p:nvPr/>
+        </p:nvPicPr>
+        <p:blipFill>
+          <a:blip r:embed="rId5">
+            <a:extLst/>
+          </a:blip>
+          <a:stretch>
+            <a:fillRect/>
+          </a:stretch>
+        </p:blipFill>
+        <p:spPr>
+          <a:xfrm>
+            <a:off x="262693" y="7717069"/>
+            <a:ext cx="1555320" cy="1909830"/>
+          </a:xfrm>
+          <a:prstGeom prst="rect">
+            <a:avLst/>
+          </a:prstGeom>
+          <a:ln w="12700">
+            <a:miter lim="400000"/>
+          </a:ln>
+        </p:spPr>
+      </p:pic>
+      <p:sp>
+        <p:nvSpPr>
+          <p:cNvPr id="355" name="MegaBomb voorbeeld"/>
+          <p:cNvSpPr/>
+          <p:nvPr/>
+        </p:nvSpPr>
+        <p:spPr>
+          <a:xfrm>
+            <a:off x="5166807" y="2095499"/>
+            <a:ext cx="3158369" cy="584201"/>
+          </a:xfrm>
+          <a:prstGeom prst="rect">
+            <a:avLst/>
+          </a:prstGeom>
+          <a:ln w="12700">
+            <a:miter lim="400000"/>
+          </a:ln>
+          <a:extLst>
+            <a:ext uri="{C572A759-6A51-4108-AA02-DFA0A04FC94B}">
+              <ma14:wrappingTextBoxFlag xmlns:ma14="http://schemas.microsoft.com/office/mac/drawingml/2011/main" val="1"/>
+            </a:ext>
+          </a:extLst>
+        </p:spPr>
+        <p:txBody>
+          <a:bodyPr wrap="none" lIns="50800" tIns="50800" rIns="50800" bIns="50800" anchor="ctr">
+            <a:spAutoFit/>
+          </a:bodyPr>
+          <a:lstStyle/>
+          <a:p>
+            <a:pPr/>
+            <a:r>
+              <a:t>MegaBomb voorbeeld</a:t>
+            </a:r>
+          </a:p>
+        </p:txBody>
+      </p:sp>
+      <p:sp>
+        <p:nvSpPr>
+          <p:cNvPr id="356" name="Main:…"/>
+          <p:cNvSpPr/>
+          <p:nvPr/>
+        </p:nvSpPr>
+        <p:spPr>
+          <a:xfrm>
+            <a:off x="2716349" y="2701263"/>
+            <a:ext cx="7572102" cy="2565401"/>
+          </a:xfrm>
+          <a:prstGeom prst="rect">
+            <a:avLst/>
+          </a:prstGeom>
+          <a:ln w="12700">
+            <a:miter lim="400000"/>
+          </a:ln>
+          <a:extLst>
+            <a:ext uri="{C572A759-6A51-4108-AA02-DFA0A04FC94B}">
+              <ma14:wrappingTextBoxFlag xmlns:ma14="http://schemas.microsoft.com/office/mac/drawingml/2011/main" val="1"/>
+            </a:ext>
+          </a:extLst>
+        </p:spPr>
+        <p:txBody>
+          <a:bodyPr wrap="none" lIns="50800" tIns="50800" rIns="50800" bIns="50800" anchor="ctr">
+            <a:spAutoFit/>
+          </a:bodyPr>
+          <a:lstStyle/>
+          <a:p>
+            <a:pPr/>
+            <a:r>
+              <a:t>Main: </a:t>
+            </a:r>
+          </a:p>
+          <a:p>
+            <a:pPr marL="411162" indent="-411162">
+              <a:buSzPct val="75000"/>
+              <a:buFont typeface="Zapf Dingbats"/>
+              <a:buChar char="-"/>
+            </a:pPr>
+            <a:r>
+              <a:t>roept vooral methodes in andere bestanden aan…</a:t>
+            </a:r>
+          </a:p>
+          <a:p>
+            <a:pPr marL="411162" indent="-411162">
+              <a:buSzPct val="75000"/>
+              <a:buFont typeface="Zapf Dingbats"/>
+              <a:buChar char="-"/>
+            </a:pPr>
+            <a:r>
+              <a:t>RTC object voor de real time clock</a:t>
+            </a:r>
+          </a:p>
+          <a:p>
+            <a:pPr marL="411162" indent="-411162">
+              <a:buSzPct val="75000"/>
+              <a:buFont typeface="Zapf Dingbats"/>
+              <a:buChar char="-"/>
+            </a:pPr>
+            <a:r>
+              <a:t>bombDisplay object voor Display (HTK16K33)</a:t>
+            </a:r>
+          </a:p>
+        </p:txBody>
+      </p:sp>
+      <p:sp>
+        <p:nvSpPr>
+          <p:cNvPr id="357" name="Helpers voor code voor:…"/>
+          <p:cNvSpPr/>
+          <p:nvPr/>
+        </p:nvSpPr>
+        <p:spPr>
+          <a:xfrm>
+            <a:off x="2716349" y="5419063"/>
+            <a:ext cx="3504225" cy="3225801"/>
+          </a:xfrm>
+          <a:prstGeom prst="rect">
+            <a:avLst/>
+          </a:prstGeom>
+          <a:ln w="12700">
+            <a:miter lim="400000"/>
+          </a:ln>
+          <a:extLst>
+            <a:ext uri="{C572A759-6A51-4108-AA02-DFA0A04FC94B}">
+              <ma14:wrappingTextBoxFlag xmlns:ma14="http://schemas.microsoft.com/office/mac/drawingml/2011/main" val="1"/>
+            </a:ext>
+          </a:extLst>
+        </p:spPr>
+        <p:txBody>
+          <a:bodyPr wrap="none" lIns="50800" tIns="50800" rIns="50800" bIns="50800" anchor="ctr">
+            <a:spAutoFit/>
+          </a:bodyPr>
+          <a:lstStyle/>
+          <a:p>
+            <a:pPr/>
+            <a:r>
+              <a:t>Helpers voor code voor:</a:t>
+            </a:r>
+          </a:p>
+          <a:p>
+            <a:pPr marL="411162" indent="-411162">
+              <a:buSzPct val="75000"/>
+              <a:buFont typeface="Zapf Dingbats"/>
+              <a:buChar char="-"/>
+            </a:pPr>
+            <a:r>
+              <a:t>Draden</a:t>
+            </a:r>
+          </a:p>
+          <a:p>
+            <a:pPr marL="411162" indent="-411162">
+              <a:buSzPct val="75000"/>
+              <a:buFont typeface="Zapf Dingbats"/>
+              <a:buChar char="-"/>
+            </a:pPr>
+            <a:r>
+              <a:t>Knoppen</a:t>
+            </a:r>
+          </a:p>
+          <a:p>
+            <a:pPr marL="411162" indent="-411162">
+              <a:buSzPct val="75000"/>
+              <a:buFont typeface="Zapf Dingbats"/>
+              <a:buChar char="-"/>
+            </a:pPr>
+            <a:r>
+              <a:t>Buzzer</a:t>
+            </a:r>
+          </a:p>
+          <a:p>
+            <a:pPr marL="411162" indent="-411162">
+              <a:buSzPct val="75000"/>
+              <a:buFont typeface="Zapf Dingbats"/>
+              <a:buChar char="-"/>
+            </a:pPr>
+            <a:r>
+              <a:t>LED</a:t>
+            </a:r>
+          </a:p>
+        </p:txBody>
+      </p:sp>
+      <p:sp>
+        <p:nvSpPr>
+          <p:cNvPr id="358" name="Tilt sensor…"/>
+          <p:cNvSpPr/>
+          <p:nvPr/>
+        </p:nvSpPr>
+        <p:spPr>
+          <a:xfrm>
+            <a:off x="6831149" y="5749263"/>
+            <a:ext cx="4705313" cy="2565401"/>
+          </a:xfrm>
+          <a:prstGeom prst="rect">
+            <a:avLst/>
+          </a:prstGeom>
+          <a:ln w="12700">
+            <a:miter lim="400000"/>
+          </a:ln>
+          <a:extLst>
+            <a:ext uri="{C572A759-6A51-4108-AA02-DFA0A04FC94B}">
+              <ma14:wrappingTextBoxFlag xmlns:ma14="http://schemas.microsoft.com/office/mac/drawingml/2011/main" val="1"/>
+            </a:ext>
+          </a:extLst>
+        </p:spPr>
+        <p:txBody>
+          <a:bodyPr wrap="none" lIns="50800" tIns="50800" rIns="50800" bIns="50800" anchor="ctr">
+            <a:spAutoFit/>
+          </a:bodyPr>
+          <a:lstStyle/>
+          <a:p>
+            <a:pPr/>
+          </a:p>
+          <a:p>
+            <a:pPr marL="411162" indent="-411162">
+              <a:buSzPct val="75000"/>
+              <a:buFont typeface="Zapf Dingbats"/>
+              <a:buChar char="-"/>
+            </a:pPr>
+            <a:r>
+              <a:t>Tilt sensor</a:t>
+            </a:r>
+          </a:p>
+          <a:p>
+            <a:pPr marL="411162" indent="-411162">
+              <a:buSzPct val="75000"/>
+              <a:buFont typeface="Zapf Dingbats"/>
+              <a:buChar char="-"/>
+            </a:pPr>
+            <a:r>
+              <a:t>Tijd</a:t>
+            </a:r>
+          </a:p>
+          <a:p>
+            <a:pPr marL="411162" indent="-411162">
+              <a:buSzPct val="75000"/>
+              <a:buFont typeface="Zapf Dingbats"/>
+              <a:buChar char="-"/>
+            </a:pPr>
+            <a:r>
+              <a:t>pitches.h (tonen voor buzzer)</a:t>
+            </a:r>
+          </a:p>
+        </p:txBody>
+      </p:sp>
+    </p:spTree>
+  </p:cSld>
+  <p:clrMapOvr>
+    <a:masterClrMapping/>
+  </p:clrMapOvr>
+  <p:transition xmlns:p14="http://schemas.microsoft.com/office/powerpoint/2010/main" spd="med" advClick="1"/>
+</p:sld>
+</file>
+
+<file path=ppt/slides/slide21.xml><?xml version="1.0" encoding="utf-8"?>
+<p:sld xmlns:a="http://schemas.openxmlformats.org/drawingml/2006/main" xmlns:r="http://schemas.openxmlformats.org/officeDocument/2006/relationships" xmlns:p="http://schemas.openxmlformats.org/presentationml/2006/main" showMasterSp="1" showMasterPhAnim="1">
+  <p:cSld>
+    <p:spTree>
+      <p:nvGrpSpPr>
+        <p:cNvPr id="1" name=""/>
+        <p:cNvGrpSpPr/>
+        <p:nvPr/>
+      </p:nvGrpSpPr>
+      <p:grpSpPr>
+        <a:xfrm>
+          <a:off x="0" y="0"/>
+          <a:ext cx="0" cy="0"/>
+          <a:chOff x="0" y="0"/>
+          <a:chExt cx="0" cy="0"/>
+        </a:xfrm>
+      </p:grpSpPr>
+      <p:sp>
+        <p:nvSpPr>
+          <p:cNvPr id="360" name="Rechthoek"/>
+          <p:cNvSpPr/>
+          <p:nvPr/>
+        </p:nvSpPr>
+        <p:spPr>
+          <a:xfrm>
+            <a:off x="-6351" y="-993"/>
+            <a:ext cx="13017501" cy="4456114"/>
+          </a:xfrm>
+          <a:prstGeom prst="rect">
+            <a:avLst/>
+          </a:prstGeom>
+          <a:solidFill>
+            <a:srgbClr val="376CAD"/>
+          </a:solidFill>
+          <a:ln w="12700">
+            <a:miter lim="400000"/>
+          </a:ln>
+        </p:spPr>
+        <p:txBody>
+          <a:bodyPr lIns="50800" tIns="50800" rIns="50800" bIns="50800" anchor="ctr"/>
+          <a:lstStyle/>
+          <a:p>
+            <a:pPr algn="ctr">
+              <a:spcBef>
+                <a:spcPts val="0"/>
+              </a:spcBef>
+              <a:defRPr i="0" spc="0" sz="2400">
+                <a:latin typeface="DIN Alternate"/>
+                <a:ea typeface="DIN Alternate"/>
+                <a:cs typeface="DIN Alternate"/>
+                <a:sym typeface="DIN Alternate"/>
+              </a:defRPr>
+            </a:pPr>
+          </a:p>
+        </p:txBody>
+      </p:sp>
+      <p:pic>
+        <p:nvPicPr>
+          <p:cNvPr id="361" name="pasted-image.pdf" descr="pasted-image.pdf"/>
+          <p:cNvPicPr>
+            <a:picLocks noChangeAspect="1"/>
+          </p:cNvPicPr>
+          <p:nvPr/>
+        </p:nvPicPr>
+        <p:blipFill>
+          <a:blip r:embed="rId2">
+            <a:extLst/>
+          </a:blip>
+          <a:stretch>
+            <a:fillRect/>
+          </a:stretch>
+        </p:blipFill>
+        <p:spPr>
+          <a:xfrm>
+            <a:off x="11184694" y="1094349"/>
+            <a:ext cx="1555319" cy="1909830"/>
+          </a:xfrm>
+          <a:prstGeom prst="rect">
+            <a:avLst/>
+          </a:prstGeom>
+          <a:ln w="12700">
+            <a:miter lim="400000"/>
+          </a:ln>
+        </p:spPr>
+      </p:pic>
+      <p:sp>
+        <p:nvSpPr>
+          <p:cNvPr id="362" name="Medio Mei verkrijgbaar"/>
+          <p:cNvSpPr/>
+          <p:nvPr>
+            <p:ph type="title"/>
+          </p:nvPr>
+        </p:nvSpPr>
+        <p:spPr>
+          <a:xfrm>
+            <a:off x="571500" y="2512813"/>
+            <a:ext cx="11861800" cy="723901"/>
+          </a:xfrm>
+          <a:prstGeom prst="rect">
+            <a:avLst/>
+          </a:prstGeom>
+        </p:spPr>
+        <p:txBody>
+          <a:bodyPr/>
+          <a:lstStyle>
+            <a:lvl1pPr defTabSz="182880">
+              <a:lnSpc>
+                <a:spcPct val="120000"/>
+              </a:lnSpc>
+              <a:spcBef>
+                <a:spcPts val="0"/>
+              </a:spcBef>
+              <a:defRPr cap="none" sz="5760">
+                <a:solidFill>
+                  <a:srgbClr val="FFFFFF"/>
+                </a:solidFill>
+                <a:latin typeface="Rhyolite"/>
+                <a:ea typeface="Rhyolite"/>
+                <a:cs typeface="Rhyolite"/>
+                <a:sym typeface="Rhyolite"/>
+              </a:defRPr>
+            </a:lvl1pPr>
+          </a:lstStyle>
+          <a:p>
+            <a:pPr/>
+            <a:r>
+              <a:t>Medio Mei verkrijgbaar</a:t>
+            </a:r>
+          </a:p>
+        </p:txBody>
+      </p:sp>
+      <p:pic>
+        <p:nvPicPr>
+          <p:cNvPr id="363" name="pasted-image.pdf" descr="pasted-image.pdf"/>
           <p:cNvPicPr>
             <a:picLocks noChangeAspect="1"/>
           </p:cNvPicPr>
@@ -8636,7 +8964,7 @@
         </p:blipFill>
         <p:spPr>
           <a:xfrm>
-            <a:off x="-41470" y="4438781"/>
+            <a:off x="-41471" y="4438781"/>
             <a:ext cx="13087804" cy="5319582"/>
           </a:xfrm>
           <a:prstGeom prst="rect">
@@ -8649,14 +8977,14 @@
       </p:pic>
       <p:sp>
         <p:nvSpPr>
-          <p:cNvPr id="352" name="Defusable Alarm Clock Shield voor Arduino"/>
-          <p:cNvSpPr/>
-          <p:nvPr/>
-        </p:nvSpPr>
-        <p:spPr>
-          <a:xfrm>
-            <a:off x="571499" y="3475797"/>
-            <a:ext cx="11861801" cy="723901"/>
+          <p:cNvPr id="364" name="Defusable Alarm Clock Shield voor Arduino"/>
+          <p:cNvSpPr/>
+          <p:nvPr/>
+        </p:nvSpPr>
+        <p:spPr>
+          <a:xfrm>
+            <a:off x="571500" y="3475797"/>
+            <a:ext cx="11861800" cy="723901"/>
           </a:xfrm>
           <a:prstGeom prst="rect">
             <a:avLst/>
@@ -8703,14 +9031,14 @@
       </p:sp>
       <p:sp>
         <p:nvSpPr>
-          <p:cNvPr id="353" name="Verwacht Medio Juni 2017:…"/>
+          <p:cNvPr id="365" name="Verwacht Medio Juni 2017:…"/>
           <p:cNvSpPr/>
           <p:nvPr/>
         </p:nvSpPr>
         <p:spPr>
           <a:xfrm>
             <a:off x="571500" y="5142699"/>
-            <a:ext cx="11861801" cy="1129625"/>
+            <a:ext cx="11861800" cy="1129625"/>
           </a:xfrm>
           <a:prstGeom prst="rect">
             <a:avLst/>
@@ -8777,7 +9105,7 @@
       </p:sp>
       <p:sp>
         <p:nvSpPr>
-          <p:cNvPr id="354" name="Mail naar jakorten@jksoftedu.nl en ik hou u op de hoogte…"/>
+          <p:cNvPr id="366" name="Mail naar jakorten@jksoftedu.nl en ik hou u op de hoogte…"/>
           <p:cNvSpPr/>
           <p:nvPr/>
         </p:nvSpPr>
@@ -8828,21 +9156,21 @@
       </p:sp>
       <p:grpSp>
         <p:nvGrpSpPr>
-          <p:cNvPr id="357" name="UNADJUSTEDNONRAW_thumb_145d.jpg"/>
+          <p:cNvPr id="369" name="UNADJUSTEDNONRAW_thumb_145d.jpg"/>
           <p:cNvGrpSpPr/>
           <p:nvPr/>
         </p:nvGrpSpPr>
         <p:grpSpPr>
           <a:xfrm rot="888928">
-            <a:off x="9694917" y="4746435"/>
-            <a:ext cx="2909583" cy="3870977"/>
+            <a:off x="9694918" y="4746434"/>
+            <a:ext cx="2909583" cy="3870978"/>
             <a:chOff x="0" y="0"/>
             <a:chExt cx="2909581" cy="3870976"/>
           </a:xfrm>
         </p:grpSpPr>
         <p:pic>
           <p:nvPicPr>
-            <p:cNvPr id="356" name="UNADJUSTEDNONRAW_thumb_145d.jpg" descr="UNADJUSTEDNONRAW_thumb_145d.jpg"/>
+            <p:cNvPr id="368" name="UNADJUSTEDNONRAW_thumb_145d.jpg" descr="UNADJUSTEDNONRAW_thumb_145d.jpg"/>
             <p:cNvPicPr>
               <a:picLocks noChangeAspect="1"/>
             </p:cNvPicPr>
@@ -8858,8 +9186,8 @@
           </p:blipFill>
           <p:spPr>
             <a:xfrm>
-              <a:off x="126999" y="88900"/>
-              <a:ext cx="2655583" cy="3540777"/>
+              <a:off x="126999" y="88899"/>
+              <a:ext cx="2655583" cy="3540778"/>
             </a:xfrm>
             <a:prstGeom prst="rect">
               <a:avLst/>
@@ -8872,7 +9200,7 @@
         </p:pic>
         <p:pic>
           <p:nvPicPr>
-            <p:cNvPr id="355" name="UNADJUSTEDNONRAW_thumb_145d.jpg" descr="UNADJUSTEDNONRAW_thumb_145d.jpg"/>
+            <p:cNvPr id="367" name="UNADJUSTEDNONRAW_thumb_145d.jpg" descr="UNADJUSTEDNONRAW_thumb_145d.jpg"/>
             <p:cNvPicPr>
               <a:picLocks noChangeAspect="0"/>
             </p:cNvPicPr>
@@ -8888,8 +9216,8 @@
           </p:blipFill>
           <p:spPr>
             <a:xfrm>
-              <a:off x="0" y="0"/>
-              <a:ext cx="2909582" cy="3870977"/>
+              <a:off x="0" y="-1"/>
+              <a:ext cx="2909582" cy="3870978"/>
             </a:xfrm>
             <a:prstGeom prst="rect">
               <a:avLst/>
@@ -8900,7 +9228,7 @@
       </p:grpSp>
       <p:pic>
         <p:nvPicPr>
-          <p:cNvPr id="358" name="pasted-image.pdf" descr="pasted-image.pdf"/>
+          <p:cNvPr id="370" name="pasted-image.pdf" descr="pasted-image.pdf"/>
           <p:cNvPicPr>
             <a:picLocks noChangeAspect="1"/>
           </p:cNvPicPr>
@@ -8929,7 +9257,7 @@
       </p:pic>
       <p:pic>
         <p:nvPicPr>
-          <p:cNvPr id="359" name="pasted-image.pdf" descr="pasted-image.pdf"/>
+          <p:cNvPr id="371" name="pasted-image.pdf" descr="pasted-image.pdf"/>
           <p:cNvPicPr>
             <a:picLocks noChangeAspect="1"/>
           </p:cNvPicPr>
@@ -8945,8 +9273,8 @@
         </p:blipFill>
         <p:spPr>
           <a:xfrm rot="20682127">
-            <a:off x="10207795" y="-13374"/>
-            <a:ext cx="1833028" cy="1738255"/>
+            <a:off x="10207794" y="-13374"/>
+            <a:ext cx="1833029" cy="1738255"/>
           </a:xfrm>
           <a:prstGeom prst="rect">
             <a:avLst/>
@@ -9198,7 +9526,7 @@
         <p:spPr>
           <a:xfrm rot="20682127">
             <a:off x="10736960" y="84794"/>
-            <a:ext cx="1833029" cy="1738256"/>
+            <a:ext cx="1833028" cy="1738256"/>
           </a:xfrm>
           <a:prstGeom prst="rect">
             <a:avLst/>
@@ -9983,7 +10311,7 @@
         <p:spPr>
           <a:xfrm>
             <a:off x="3849804" y="2132086"/>
-            <a:ext cx="5305193" cy="584201"/>
+            <a:ext cx="5305192" cy="584201"/>
           </a:xfrm>
           <a:prstGeom prst="rect">
             <a:avLst/>
@@ -11359,7 +11687,7 @@
       </p:pic>
       <p:sp>
         <p:nvSpPr>
-          <p:cNvPr id="218" name="Buzzer"/>
+          <p:cNvPr id="218" name="Serial"/>
           <p:cNvSpPr/>
           <p:nvPr>
             <p:ph type="title"/>
@@ -11394,7 +11722,7 @@
           <a:p>
             <a:pPr/>
             <a:r>
-              <a:t>Buzzer</a:t>
+              <a:t>Serial</a:t>
             </a:r>
           </a:p>
         </p:txBody>
@@ -11483,55 +11811,9 @@
           </a:p>
         </p:txBody>
       </p:sp>
-      <p:sp>
-        <p:nvSpPr>
-          <p:cNvPr id="221" name="Zit op PWM pin…"/>
-          <p:cNvSpPr/>
-          <p:nvPr>
-            <p:ph type="body" idx="4294967295"/>
-          </p:nvPr>
-        </p:nvSpPr>
-        <p:spPr>
-          <a:xfrm>
-            <a:off x="571500" y="2605550"/>
-            <a:ext cx="11861800" cy="6424150"/>
-          </a:xfrm>
-          <a:prstGeom prst="rect">
-            <a:avLst/>
-          </a:prstGeom>
-        </p:spPr>
-        <p:txBody>
-          <a:bodyPr/>
-          <a:lstStyle/>
-          <a:p>
-            <a:pPr>
-              <a:defRPr>
-                <a:solidFill>
-                  <a:srgbClr val="000000"/>
-                </a:solidFill>
-              </a:defRPr>
-            </a:pPr>
-            <a:r>
-              <a:t>Zit op PWM pin</a:t>
-            </a:r>
-          </a:p>
-          <a:p>
-            <a:pPr>
-              <a:defRPr>
-                <a:solidFill>
-                  <a:srgbClr val="000000"/>
-                </a:solidFill>
-              </a:defRPr>
-            </a:pPr>
-            <a:r>
-              <a:t>Wat is PWM?</a:t>
-            </a:r>
-          </a:p>
-        </p:txBody>
-      </p:sp>
       <p:pic>
         <p:nvPicPr>
-          <p:cNvPr id="222" name="pasted-image.pdf" descr="pasted-image.pdf"/>
+          <p:cNvPr id="221" name="pasted-image.pdf" descr="pasted-image.pdf"/>
           <p:cNvPicPr>
             <a:picLocks noChangeAspect="1"/>
           </p:cNvPicPr>
@@ -11546,9 +11828,9 @@
           </a:stretch>
         </p:blipFill>
         <p:spPr>
-          <a:xfrm rot="20682127">
-            <a:off x="10736960" y="84794"/>
-            <a:ext cx="1833028" cy="1738256"/>
+          <a:xfrm>
+            <a:off x="262693" y="7717069"/>
+            <a:ext cx="1555320" cy="1909830"/>
           </a:xfrm>
           <a:prstGeom prst="rect">
             <a:avLst/>
@@ -11560,7 +11842,7 @@
       </p:pic>
       <p:pic>
         <p:nvPicPr>
-          <p:cNvPr id="223" name="pasted-image.pdf" descr="pasted-image.pdf"/>
+          <p:cNvPr id="222" name="pasted-image.pdf" descr="pasted-image.pdf"/>
           <p:cNvPicPr>
             <a:picLocks noChangeAspect="1"/>
           </p:cNvPicPr>
@@ -11575,9 +11857,9 @@
           </a:stretch>
         </p:blipFill>
         <p:spPr>
-          <a:xfrm>
-            <a:off x="262693" y="7717069"/>
-            <a:ext cx="1555320" cy="1909830"/>
+          <a:xfrm rot="20682127">
+            <a:off x="10736960" y="84794"/>
+            <a:ext cx="1833028" cy="1738256"/>
           </a:xfrm>
           <a:prstGeom prst="rect">
             <a:avLst/>
@@ -11587,6 +11869,214 @@
           </a:ln>
         </p:spPr>
       </p:pic>
+      <p:sp>
+        <p:nvSpPr>
+          <p:cNvPr id="223" name="int knopA = 2; // digitale pin 2, knop A…"/>
+          <p:cNvSpPr/>
+          <p:nvPr/>
+        </p:nvSpPr>
+        <p:spPr>
+          <a:xfrm>
+            <a:off x="2031611" y="2884619"/>
+            <a:ext cx="10475520" cy="4699001"/>
+          </a:xfrm>
+          <a:prstGeom prst="rect">
+            <a:avLst/>
+          </a:prstGeom>
+          <a:ln w="12700">
+            <a:miter lim="400000"/>
+          </a:ln>
+          <a:extLst>
+            <a:ext uri="{C572A759-6A51-4108-AA02-DFA0A04FC94B}">
+              <ma14:wrappingTextBoxFlag xmlns:ma14="http://schemas.microsoft.com/office/mac/drawingml/2011/main" val="1"/>
+            </a:ext>
+          </a:extLst>
+        </p:spPr>
+        <p:txBody>
+          <a:bodyPr lIns="50800" tIns="50800" rIns="50800" bIns="50800" anchor="ctr">
+            <a:spAutoFit/>
+          </a:bodyPr>
+          <a:lstStyle/>
+          <a:p>
+            <a:pPr>
+              <a:defRPr i="0" spc="18" sz="1800">
+                <a:solidFill>
+                  <a:srgbClr val="000000"/>
+                </a:solidFill>
+              </a:defRPr>
+            </a:pPr>
+            <a:r>
+              <a:t>int knopA = 2; // digitale pin 2, knop A</a:t>
+            </a:r>
+            <a:br/>
+          </a:p>
+          <a:p>
+            <a:pPr>
+              <a:defRPr i="0" spc="18" sz="1800">
+                <a:solidFill>
+                  <a:srgbClr val="000000"/>
+                </a:solidFill>
+              </a:defRPr>
+            </a:pPr>
+            <a:r>
+              <a:t>void setup() {</a:t>
+            </a:r>
+          </a:p>
+          <a:p>
+            <a:pPr>
+              <a:defRPr i="0" spc="18" sz="1800">
+                <a:solidFill>
+                  <a:srgbClr val="000000"/>
+                </a:solidFill>
+              </a:defRPr>
+            </a:pPr>
+            <a:r>
+              <a:t>  Serial.begin(9600); // initialize serial communications at 9600 bps:</a:t>
+            </a:r>
+          </a:p>
+          <a:p>
+            <a:pPr>
+              <a:defRPr i="0" spc="18" sz="1800">
+                <a:solidFill>
+                  <a:srgbClr val="000000"/>
+                </a:solidFill>
+              </a:defRPr>
+            </a:pPr>
+            <a:r>
+              <a:t>}</a:t>
+            </a:r>
+          </a:p>
+          <a:p>
+            <a:pPr>
+              <a:defRPr i="0" spc="18" sz="1800">
+                <a:solidFill>
+                  <a:srgbClr val="000000"/>
+                </a:solidFill>
+              </a:defRPr>
+            </a:pPr>
+            <a:r>
+              <a:t>void loop() {</a:t>
+            </a:r>
+          </a:p>
+          <a:p>
+            <a:pPr>
+              <a:defRPr i="0" spc="18" sz="1800">
+                <a:solidFill>
+                  <a:srgbClr val="000000"/>
+                </a:solidFill>
+              </a:defRPr>
+            </a:pPr>
+            <a:r>
+              <a:t>  int knopStatus = digitalRead(knopA);</a:t>
+            </a:r>
+          </a:p>
+          <a:p>
+            <a:pPr>
+              <a:defRPr i="0" spc="18" sz="1800">
+                <a:solidFill>
+                  <a:srgbClr val="000000"/>
+                </a:solidFill>
+              </a:defRPr>
+            </a:pPr>
+            <a:r>
+              <a:t>  Serial.print("Knop 1 status: ");</a:t>
+            </a:r>
+          </a:p>
+          <a:p>
+            <a:pPr>
+              <a:defRPr i="0" spc="18" sz="1800">
+                <a:solidFill>
+                  <a:srgbClr val="000000"/>
+                </a:solidFill>
+              </a:defRPr>
+            </a:pPr>
+            <a:r>
+              <a:t>  Serial.println(knopStatus);</a:t>
+            </a:r>
+          </a:p>
+          <a:p>
+            <a:pPr>
+              <a:defRPr i="0" spc="18" sz="1800">
+                <a:solidFill>
+                  <a:srgbClr val="000000"/>
+                </a:solidFill>
+              </a:defRPr>
+            </a:pPr>
+            <a:r>
+              <a:t>}</a:t>
+            </a:r>
+          </a:p>
+        </p:txBody>
+      </p:sp>
+      <p:pic>
+        <p:nvPicPr>
+          <p:cNvPr id="224" name="pasted-image.png" descr="pasted-image.png"/>
+          <p:cNvPicPr>
+            <a:picLocks noChangeAspect="1"/>
+          </p:cNvPicPr>
+          <p:nvPr/>
+        </p:nvPicPr>
+        <p:blipFill>
+          <a:blip r:embed="rId6">
+            <a:extLst/>
+          </a:blip>
+          <a:stretch>
+            <a:fillRect/>
+          </a:stretch>
+        </p:blipFill>
+        <p:spPr>
+          <a:xfrm>
+            <a:off x="9850966" y="2516716"/>
+            <a:ext cx="2235201" cy="1231901"/>
+          </a:xfrm>
+          <a:prstGeom prst="rect">
+            <a:avLst/>
+          </a:prstGeom>
+          <a:ln w="12700">
+            <a:miter lim="400000"/>
+          </a:ln>
+        </p:spPr>
+      </p:pic>
+      <p:sp>
+        <p:nvSpPr>
+          <p:cNvPr id="225" name="Lijn"/>
+          <p:cNvSpPr/>
+          <p:nvPr/>
+        </p:nvSpPr>
+        <p:spPr>
+          <a:xfrm flipV="1">
+            <a:off x="8256229" y="3039533"/>
+            <a:ext cx="3405939" cy="3405939"/>
+          </a:xfrm>
+          <a:prstGeom prst="line">
+            <a:avLst/>
+          </a:prstGeom>
+          <a:ln w="101600">
+            <a:solidFill>
+              <a:srgbClr val="747676"/>
+            </a:solidFill>
+            <a:miter lim="400000"/>
+            <a:tailEnd type="triangle"/>
+          </a:ln>
+        </p:spPr>
+        <p:txBody>
+          <a:bodyPr lIns="50800" tIns="50800" rIns="50800" bIns="50800" anchor="ctr"/>
+          <a:lstStyle/>
+          <a:p>
+            <a:pPr algn="ctr">
+              <a:spcBef>
+                <a:spcPts val="0"/>
+              </a:spcBef>
+              <a:defRPr i="0" spc="0" sz="2400">
+                <a:latin typeface="DIN Alternate"/>
+                <a:ea typeface="DIN Alternate"/>
+                <a:cs typeface="DIN Alternate"/>
+                <a:sym typeface="DIN Alternate"/>
+              </a:defRPr>
+            </a:pPr>
+          </a:p>
+        </p:txBody>
+      </p:sp>
     </p:spTree>
   </p:cSld>
   <p:clrMapOvr>

</xml_diff>